<commit_message>
wrapped up lab2 slides and code
</commit_message>
<xml_diff>
--- a/lab2/CIS330_S18_Lab2.pptx
+++ b/lab2/CIS330_S18_Lab2.pptx
@@ -5,7 +5,7 @@
     <p:sldMasterId id="2147483715" r:id="rId1"/>
   </p:sldMasterIdLst>
   <p:notesMasterIdLst>
-    <p:notesMasterId r:id="rId24"/>
+    <p:notesMasterId r:id="rId25"/>
   </p:notesMasterIdLst>
   <p:sldIdLst>
     <p:sldId id="259" r:id="rId2"/>
@@ -18,18 +18,19 @@
     <p:sldId id="525" r:id="rId9"/>
     <p:sldId id="526" r:id="rId10"/>
     <p:sldId id="513" r:id="rId11"/>
-    <p:sldId id="514" r:id="rId12"/>
-    <p:sldId id="515" r:id="rId13"/>
-    <p:sldId id="527" r:id="rId14"/>
-    <p:sldId id="528" r:id="rId15"/>
-    <p:sldId id="529" r:id="rId16"/>
-    <p:sldId id="530" r:id="rId17"/>
-    <p:sldId id="531" r:id="rId18"/>
-    <p:sldId id="522" r:id="rId19"/>
-    <p:sldId id="532" r:id="rId20"/>
-    <p:sldId id="533" r:id="rId21"/>
-    <p:sldId id="534" r:id="rId22"/>
-    <p:sldId id="523" r:id="rId23"/>
+    <p:sldId id="534" r:id="rId12"/>
+    <p:sldId id="514" r:id="rId13"/>
+    <p:sldId id="515" r:id="rId14"/>
+    <p:sldId id="527" r:id="rId15"/>
+    <p:sldId id="528" r:id="rId16"/>
+    <p:sldId id="529" r:id="rId17"/>
+    <p:sldId id="530" r:id="rId18"/>
+    <p:sldId id="531" r:id="rId19"/>
+    <p:sldId id="535" r:id="rId20"/>
+    <p:sldId id="532" r:id="rId21"/>
+    <p:sldId id="533" r:id="rId22"/>
+    <p:sldId id="522" r:id="rId23"/>
+    <p:sldId id="523" r:id="rId24"/>
   </p:sldIdLst>
   <p:sldSz cx="9144000" cy="6858000" type="screen4x3"/>
   <p:notesSz cx="6858000" cy="9144000"/>
@@ -130,7 +131,7 @@
   </p:defaultTextStyle>
   <p:extLst>
     <p:ext uri="{EFAFB233-063F-42B5-8137-9DF3F51BA10A}">
-      <p15:sldGuideLst xmlns:p15="http://schemas.microsoft.com/office/powerpoint/2012/main" xmlns="">
+      <p15:sldGuideLst xmlns:p15="http://schemas.microsoft.com/office/powerpoint/2012/main">
         <p15:guide id="1" orient="horz" pos="2160">
           <p15:clr>
             <a:srgbClr val="A4A3A4"/>
@@ -229,7 +230,7 @@
           <a:p>
             <a:fld id="{A1BFE53B-5066-174C-A72E-F750F1526F61}" type="datetimeFigureOut">
               <a:rPr lang="en-US" smtClean="0"/>
-              <a:t>4/24/18</a:t>
+              <a:t>4/25/18</a:t>
             </a:fld>
             <a:endParaRPr lang="en-US"/>
           </a:p>
@@ -645,7 +646,7 @@
           <a:p>
             <a:fld id="{39FB796E-1204-6D45-A7B7-2B1650A5088F}" type="slidenum">
               <a:rPr lang="en-US" smtClean="0"/>
-              <a:t>19</a:t>
+              <a:t>18</a:t>
             </a:fld>
             <a:endParaRPr lang="en-US"/>
           </a:p>
@@ -654,7 +655,7 @@
     </p:spTree>
     <p:extLst>
       <p:ext uri="{BB962C8B-B14F-4D97-AF65-F5344CB8AC3E}">
-        <p14:creationId xmlns:p14="http://schemas.microsoft.com/office/powerpoint/2010/main" val="657732036"/>
+        <p14:creationId xmlns:p14="http://schemas.microsoft.com/office/powerpoint/2010/main" val="2099147132"/>
       </p:ext>
     </p:extLst>
   </p:cSld>
@@ -729,7 +730,7 @@
           <a:p>
             <a:fld id="{39FB796E-1204-6D45-A7B7-2B1650A5088F}" type="slidenum">
               <a:rPr lang="en-US" smtClean="0"/>
-              <a:t>20</a:t>
+              <a:t>19</a:t>
             </a:fld>
             <a:endParaRPr lang="en-US"/>
           </a:p>
@@ -738,7 +739,7 @@
     </p:spTree>
     <p:extLst>
       <p:ext uri="{BB962C8B-B14F-4D97-AF65-F5344CB8AC3E}">
-        <p14:creationId xmlns:p14="http://schemas.microsoft.com/office/powerpoint/2010/main" val="2070756374"/>
+        <p14:creationId xmlns:p14="http://schemas.microsoft.com/office/powerpoint/2010/main" val="1215465149"/>
       </p:ext>
     </p:extLst>
   </p:cSld>
@@ -813,6 +814,90 @@
           <a:p>
             <a:fld id="{39FB796E-1204-6D45-A7B7-2B1650A5088F}" type="slidenum">
               <a:rPr lang="en-US" smtClean="0"/>
+              <a:t>20</a:t>
+            </a:fld>
+            <a:endParaRPr lang="en-US"/>
+          </a:p>
+        </p:txBody>
+      </p:sp>
+    </p:spTree>
+    <p:extLst>
+      <p:ext uri="{BB962C8B-B14F-4D97-AF65-F5344CB8AC3E}">
+        <p14:creationId xmlns:p14="http://schemas.microsoft.com/office/powerpoint/2010/main" val="657732036"/>
+      </p:ext>
+    </p:extLst>
+  </p:cSld>
+  <p:clrMapOvr>
+    <a:masterClrMapping/>
+  </p:clrMapOvr>
+</p:notes>
+</file>
+
+<file path=ppt/notesSlides/notesSlide13.xml><?xml version="1.0" encoding="utf-8"?>
+<p:notes xmlns:a="http://schemas.openxmlformats.org/drawingml/2006/main" xmlns:r="http://schemas.openxmlformats.org/officeDocument/2006/relationships" xmlns:p="http://schemas.openxmlformats.org/presentationml/2006/main">
+  <p:cSld>
+    <p:spTree>
+      <p:nvGrpSpPr>
+        <p:cNvPr id="1" name=""/>
+        <p:cNvGrpSpPr/>
+        <p:nvPr/>
+      </p:nvGrpSpPr>
+      <p:grpSpPr>
+        <a:xfrm>
+          <a:off x="0" y="0"/>
+          <a:ext cx="0" cy="0"/>
+          <a:chOff x="0" y="0"/>
+          <a:chExt cx="0" cy="0"/>
+        </a:xfrm>
+      </p:grpSpPr>
+      <p:sp>
+        <p:nvSpPr>
+          <p:cNvPr id="2" name="Slide Image Placeholder 1"/>
+          <p:cNvSpPr>
+            <a:spLocks noGrp="1" noRot="1" noChangeAspect="1"/>
+          </p:cNvSpPr>
+          <p:nvPr>
+            <p:ph type="sldImg"/>
+          </p:nvPr>
+        </p:nvSpPr>
+        <p:spPr/>
+      </p:sp>
+      <p:sp>
+        <p:nvSpPr>
+          <p:cNvPr id="3" name="Notes Placeholder 2"/>
+          <p:cNvSpPr>
+            <a:spLocks noGrp="1"/>
+          </p:cNvSpPr>
+          <p:nvPr>
+            <p:ph type="body" idx="1"/>
+          </p:nvPr>
+        </p:nvSpPr>
+        <p:spPr/>
+        <p:txBody>
+          <a:bodyPr/>
+          <a:lstStyle/>
+          <a:p>
+            <a:endParaRPr lang="en-US"/>
+          </a:p>
+        </p:txBody>
+      </p:sp>
+      <p:sp>
+        <p:nvSpPr>
+          <p:cNvPr id="4" name="Slide Number Placeholder 3"/>
+          <p:cNvSpPr>
+            <a:spLocks noGrp="1"/>
+          </p:cNvSpPr>
+          <p:nvPr>
+            <p:ph type="sldNum" sz="quarter" idx="10"/>
+          </p:nvPr>
+        </p:nvSpPr>
+        <p:spPr/>
+        <p:txBody>
+          <a:bodyPr/>
+          <a:lstStyle/>
+          <a:p>
+            <a:fld id="{39FB796E-1204-6D45-A7B7-2B1650A5088F}" type="slidenum">
+              <a:rPr lang="en-US" smtClean="0"/>
               <a:t>21</a:t>
             </a:fld>
             <a:endParaRPr lang="en-US"/>
@@ -822,7 +907,7 @@
     </p:spTree>
     <p:extLst>
       <p:ext uri="{BB962C8B-B14F-4D97-AF65-F5344CB8AC3E}">
-        <p14:creationId xmlns:p14="http://schemas.microsoft.com/office/powerpoint/2010/main" val="3012759207"/>
+        <p14:creationId xmlns:p14="http://schemas.microsoft.com/office/powerpoint/2010/main" val="2070756374"/>
       </p:ext>
     </p:extLst>
   </p:cSld>
@@ -1149,7 +1234,7 @@
           <a:p>
             <a:fld id="{39FB796E-1204-6D45-A7B7-2B1650A5088F}" type="slidenum">
               <a:rPr lang="en-US" smtClean="0"/>
-              <a:t>13</a:t>
+              <a:t>11</a:t>
             </a:fld>
             <a:endParaRPr lang="en-US"/>
           </a:p>
@@ -1158,7 +1243,7 @@
     </p:spTree>
     <p:extLst>
       <p:ext uri="{BB962C8B-B14F-4D97-AF65-F5344CB8AC3E}">
-        <p14:creationId xmlns:p14="http://schemas.microsoft.com/office/powerpoint/2010/main" val="441799574"/>
+        <p14:creationId xmlns:p14="http://schemas.microsoft.com/office/powerpoint/2010/main" val="3012759207"/>
       </p:ext>
     </p:extLst>
   </p:cSld>
@@ -1242,7 +1327,7 @@
     </p:spTree>
     <p:extLst>
       <p:ext uri="{BB962C8B-B14F-4D97-AF65-F5344CB8AC3E}">
-        <p14:creationId xmlns:p14="http://schemas.microsoft.com/office/powerpoint/2010/main" val="3437827310"/>
+        <p14:creationId xmlns:p14="http://schemas.microsoft.com/office/powerpoint/2010/main" val="441799574"/>
       </p:ext>
     </p:extLst>
   </p:cSld>
@@ -1326,7 +1411,7 @@
     </p:spTree>
     <p:extLst>
       <p:ext uri="{BB962C8B-B14F-4D97-AF65-F5344CB8AC3E}">
-        <p14:creationId xmlns:p14="http://schemas.microsoft.com/office/powerpoint/2010/main" val="730261676"/>
+        <p14:creationId xmlns:p14="http://schemas.microsoft.com/office/powerpoint/2010/main" val="3437827310"/>
       </p:ext>
     </p:extLst>
   </p:cSld>
@@ -1410,7 +1495,7 @@
     </p:spTree>
     <p:extLst>
       <p:ext uri="{BB962C8B-B14F-4D97-AF65-F5344CB8AC3E}">
-        <p14:creationId xmlns:p14="http://schemas.microsoft.com/office/powerpoint/2010/main" val="3746967807"/>
+        <p14:creationId xmlns:p14="http://schemas.microsoft.com/office/powerpoint/2010/main" val="730261676"/>
       </p:ext>
     </p:extLst>
   </p:cSld>
@@ -1494,7 +1579,7 @@
     </p:spTree>
     <p:extLst>
       <p:ext uri="{BB962C8B-B14F-4D97-AF65-F5344CB8AC3E}">
-        <p14:creationId xmlns:p14="http://schemas.microsoft.com/office/powerpoint/2010/main" val="2099147132"/>
+        <p14:creationId xmlns:p14="http://schemas.microsoft.com/office/powerpoint/2010/main" val="3746967807"/>
       </p:ext>
     </p:extLst>
   </p:cSld>
@@ -1684,7 +1769,7 @@
             <a:fld id="{62963806-7F59-464B-AFD0-4480C81518EB}" type="datetimeFigureOut">
               <a:rPr lang="en-US" smtClean="0"/>
               <a:pPr/>
-              <a:t>4/24/18</a:t>
+              <a:t>4/25/18</a:t>
             </a:fld>
             <a:endParaRPr lang="en-US"/>
           </a:p>
@@ -1849,7 +1934,7 @@
             <a:fld id="{62963806-7F59-464B-AFD0-4480C81518EB}" type="datetimeFigureOut">
               <a:rPr lang="en-US" smtClean="0"/>
               <a:pPr/>
-              <a:t>4/24/18</a:t>
+              <a:t>4/25/18</a:t>
             </a:fld>
             <a:endParaRPr lang="en-US"/>
           </a:p>
@@ -2024,7 +2109,7 @@
             <a:fld id="{62963806-7F59-464B-AFD0-4480C81518EB}" type="datetimeFigureOut">
               <a:rPr lang="en-US" smtClean="0"/>
               <a:pPr/>
-              <a:t>4/24/18</a:t>
+              <a:t>4/25/18</a:t>
             </a:fld>
             <a:endParaRPr lang="en-US"/>
           </a:p>
@@ -2189,7 +2274,7 @@
             <a:fld id="{62963806-7F59-464B-AFD0-4480C81518EB}" type="datetimeFigureOut">
               <a:rPr lang="en-US" smtClean="0"/>
               <a:pPr/>
-              <a:t>4/24/18</a:t>
+              <a:t>4/25/18</a:t>
             </a:fld>
             <a:endParaRPr lang="en-US"/>
           </a:p>
@@ -2431,7 +2516,7 @@
             <a:fld id="{62963806-7F59-464B-AFD0-4480C81518EB}" type="datetimeFigureOut">
               <a:rPr lang="en-US" smtClean="0"/>
               <a:pPr/>
-              <a:t>4/24/18</a:t>
+              <a:t>4/25/18</a:t>
             </a:fld>
             <a:endParaRPr lang="en-US"/>
           </a:p>
@@ -2713,7 +2798,7 @@
             <a:fld id="{62963806-7F59-464B-AFD0-4480C81518EB}" type="datetimeFigureOut">
               <a:rPr lang="en-US" smtClean="0"/>
               <a:pPr/>
-              <a:t>4/24/18</a:t>
+              <a:t>4/25/18</a:t>
             </a:fld>
             <a:endParaRPr lang="en-US"/>
           </a:p>
@@ -3129,7 +3214,7 @@
             <a:fld id="{62963806-7F59-464B-AFD0-4480C81518EB}" type="datetimeFigureOut">
               <a:rPr lang="en-US" smtClean="0"/>
               <a:pPr/>
-              <a:t>4/24/18</a:t>
+              <a:t>4/25/18</a:t>
             </a:fld>
             <a:endParaRPr lang="en-US"/>
           </a:p>
@@ -3243,7 +3328,7 @@
             <a:fld id="{62963806-7F59-464B-AFD0-4480C81518EB}" type="datetimeFigureOut">
               <a:rPr lang="en-US" smtClean="0"/>
               <a:pPr/>
-              <a:t>4/24/18</a:t>
+              <a:t>4/25/18</a:t>
             </a:fld>
             <a:endParaRPr lang="en-US"/>
           </a:p>
@@ -3335,7 +3420,7 @@
             <a:fld id="{62963806-7F59-464B-AFD0-4480C81518EB}" type="datetimeFigureOut">
               <a:rPr lang="en-US" smtClean="0"/>
               <a:pPr/>
-              <a:t>4/24/18</a:t>
+              <a:t>4/25/18</a:t>
             </a:fld>
             <a:endParaRPr lang="en-US"/>
           </a:p>
@@ -3607,7 +3692,7 @@
             <a:fld id="{62963806-7F59-464B-AFD0-4480C81518EB}" type="datetimeFigureOut">
               <a:rPr lang="en-US" smtClean="0"/>
               <a:pPr/>
-              <a:t>4/24/18</a:t>
+              <a:t>4/25/18</a:t>
             </a:fld>
             <a:endParaRPr lang="en-US"/>
           </a:p>
@@ -3856,7 +3941,7 @@
             <a:fld id="{62963806-7F59-464B-AFD0-4480C81518EB}" type="datetimeFigureOut">
               <a:rPr lang="en-US" smtClean="0"/>
               <a:pPr/>
-              <a:t>4/24/18</a:t>
+              <a:t>4/25/18</a:t>
             </a:fld>
             <a:endParaRPr lang="en-US"/>
           </a:p>
@@ -4064,7 +4149,7 @@
             <a:fld id="{62963806-7F59-464B-AFD0-4480C81518EB}" type="datetimeFigureOut">
               <a:rPr lang="en-US" smtClean="0"/>
               <a:pPr/>
-              <a:t>4/24/18</a:t>
+              <a:t>4/25/18</a:t>
             </a:fld>
             <a:endParaRPr lang="en-US"/>
           </a:p>
@@ -4651,14 +4736,14 @@
           </a:ln>
           <a:extLst>
             <a:ext uri="{909E8E84-426E-40dd-AFC4-6F175D3DCCD1}">
-              <a14:hiddenFill xmlns:a14="http://schemas.microsoft.com/office/drawing/2010/main">
+              <a14:hiddenFill xmlns:a14="http://schemas.microsoft.com/office/drawing/2010/main" xmlns="">
                 <a:solidFill>
                   <a:srgbClr val="FFFFFF"/>
                 </a:solidFill>
               </a14:hiddenFill>
             </a:ext>
             <a:ext uri="{91240B29-F687-4f45-9708-019B960494DF}">
-              <a14:hiddenLine xmlns:a14="http://schemas.microsoft.com/office/drawing/2010/main" w="9525">
+              <a14:hiddenLine xmlns:a14="http://schemas.microsoft.com/office/drawing/2010/main" xmlns="" w="9525">
                 <a:solidFill>
                   <a:srgbClr val="000000"/>
                 </a:solidFill>
@@ -4784,14 +4869,29 @@
           <a:p>
             <a:pPr algn="ctr" eaLnBrk="1" hangingPunct="1"/>
             <a:r>
-              <a:rPr lang="en-US" sz="2600">
+              <a:rPr lang="en-US" sz="2600" dirty="0">
                 <a:solidFill>
                   <a:schemeClr val="bg1"/>
                 </a:solidFill>
                 <a:latin typeface="Tw Cen MT" charset="0"/>
               </a:rPr>
-              <a:t>April 21, 2017</a:t>
-            </a:r>
+              <a:t>April </a:t>
+            </a:r>
+            <a:r>
+              <a:rPr lang="en-US" sz="2600" dirty="0" smtClean="0">
+                <a:solidFill>
+                  <a:schemeClr val="bg1"/>
+                </a:solidFill>
+                <a:latin typeface="Tw Cen MT" charset="0"/>
+              </a:rPr>
+              <a:t>25, 2018</a:t>
+            </a:r>
+            <a:endParaRPr lang="en-US" sz="2600" dirty="0">
+              <a:solidFill>
+                <a:schemeClr val="bg1"/>
+              </a:solidFill>
+              <a:latin typeface="Tw Cen MT" charset="0"/>
+            </a:endParaRPr>
           </a:p>
         </p:txBody>
       </p:sp>
@@ -5018,7 +5118,7 @@
           <a:lstStyle/>
           <a:p>
             <a:r>
-              <a:rPr lang="en-US">
+              <a:rPr lang="en-US" dirty="0">
                 <a:solidFill>
                   <a:srgbClr val="881280"/>
                 </a:solidFill>
@@ -5027,63 +5127,75 @@
               <a:t>"</a:t>
             </a:r>
             <a:r>
-              <a:rPr lang="en-US">
+              <a:rPr lang="en-US" dirty="0">
                 <a:latin typeface="monospace"/>
               </a:rPr>
               <a:t>I searched my .</a:t>
             </a:r>
             <a:r>
-              <a:rPr lang="en-US" err="1">
+              <a:rPr lang="en-US" dirty="0" err="1">
                 <a:latin typeface="monospace"/>
               </a:rPr>
               <a:t>bash_history</a:t>
             </a:r>
             <a:r>
-              <a:rPr lang="en-US">
+              <a:rPr lang="en-US" dirty="0">
                 <a:latin typeface="monospace"/>
               </a:rPr>
               <a:t> for the line with the highest ratio of special characters to regular alphanumeric characters, and the winner was: </a:t>
             </a:r>
-            <a:endParaRPr lang="en-US">
+            <a:endParaRPr lang="en-US" dirty="0">
               <a:latin typeface="Calibri"/>
             </a:endParaRPr>
           </a:p>
           <a:p>
-            <a:endParaRPr lang="en-US">
+            <a:endParaRPr lang="en-US" dirty="0">
               <a:latin typeface="monospace"/>
             </a:endParaRPr>
           </a:p>
           <a:p>
             <a:r>
-              <a:rPr lang="en-US" b="1">
+              <a:rPr lang="en-US" b="1" dirty="0">
                 <a:latin typeface="monospace"/>
               </a:rPr>
-              <a:t>cat out.txt | grep -o "[[(].*[])][^)]]*$"</a:t>
-            </a:r>
-            <a:r>
-              <a:rPr lang="en-US">
+              <a:t>cat </a:t>
+            </a:r>
+            <a:r>
+              <a:rPr lang="en-US" b="1" dirty="0" err="1">
                 <a:latin typeface="monospace"/>
               </a:rPr>
+              <a:t>out.txt</a:t>
+            </a:r>
+            <a:r>
+              <a:rPr lang="en-US" b="1" dirty="0">
+                <a:latin typeface="monospace"/>
+              </a:rPr>
+              <a:t> | grep -o "[[(].*[])][^)]]*$"</a:t>
+            </a:r>
+            <a:r>
+              <a:rPr lang="en-US" dirty="0">
+                <a:latin typeface="monospace"/>
+              </a:rPr>
               <a:t> </a:t>
             </a:r>
-            <a:endParaRPr lang="en-US">
+            <a:endParaRPr lang="en-US" dirty="0">
               <a:latin typeface="Calibri"/>
             </a:endParaRPr>
           </a:p>
           <a:p>
-            <a:endParaRPr lang="en-US">
+            <a:endParaRPr lang="en-US" dirty="0">
               <a:latin typeface="monospace"/>
             </a:endParaRPr>
           </a:p>
           <a:p>
             <a:r>
-              <a:rPr lang="en-US">
+              <a:rPr lang="en-US" dirty="0">
                 <a:latin typeface="monospace"/>
               </a:rPr>
               <a:t>I have no memory of this and no idea what I was trying to do, but I sure hope it worked.</a:t>
             </a:r>
             <a:r>
-              <a:rPr lang="en-US">
+              <a:rPr lang="en-US" dirty="0">
                 <a:solidFill>
                   <a:srgbClr val="881280"/>
                 </a:solidFill>
@@ -5091,7 +5203,7 @@
               </a:rPr>
               <a:t>"</a:t>
             </a:r>
-            <a:endParaRPr lang="en-US"/>
+            <a:endParaRPr lang="en-US" dirty="0"/>
           </a:p>
         </p:txBody>
       </p:sp>
@@ -5104,7 +5216,7 @@
         <p:spPr>
           <a:xfrm>
             <a:off x="6448425" y="4972050"/>
-            <a:ext cx="2743200" cy="307777"/>
+            <a:ext cx="2743200" cy="523220"/>
           </a:xfrm>
           <a:prstGeom prst="rect">
             <a:avLst/>
@@ -5118,29 +5230,33 @@
           <a:p>
             <a:pPr algn="ctr"/>
             <a:r>
-              <a:rPr lang="en-US" sz="1400">
-                <a:solidFill>
-                  <a:srgbClr val="A5A5A5"/>
-                </a:solidFill>
-              </a:rPr>
+              <a:rPr lang="en-US" sz="1400" dirty="0" smtClean="0"/>
+              <a:t>-- </a:t>
+            </a:r>
+            <a:r>
+              <a:rPr lang="en-US" sz="1400" dirty="0" smtClean="0"/>
               <a:t>from </a:t>
             </a:r>
             <a:r>
-              <a:rPr lang="en-US" sz="1400" err="1">
-                <a:solidFill>
-                  <a:srgbClr val="A5A5A5"/>
-                </a:solidFill>
-              </a:rPr>
+              <a:rPr lang="en-US" sz="1400" dirty="0" err="1"/>
               <a:t>xkcd</a:t>
             </a:r>
             <a:r>
-              <a:rPr lang="en-US" sz="1400">
-                <a:solidFill>
-                  <a:srgbClr val="A5A5A5"/>
-                </a:solidFill>
-              </a:rPr>
-              <a:t> 1638</a:t>
-            </a:r>
+              <a:rPr lang="en-US" sz="1400" dirty="0"/>
+              <a:t> </a:t>
+            </a:r>
+            <a:r>
+              <a:rPr lang="en-US" sz="1400" dirty="0" smtClean="0"/>
+              <a:t>#1638</a:t>
+            </a:r>
+          </a:p>
+          <a:p>
+            <a:pPr algn="ctr"/>
+            <a:r>
+              <a:rPr lang="en-US" sz="1400" dirty="0" err="1" smtClean="0"/>
+              <a:t>xkcd.com</a:t>
+            </a:r>
+            <a:endParaRPr lang="en-US" sz="1400" dirty="0"/>
           </a:p>
         </p:txBody>
       </p:sp>
@@ -5154,6 +5270,13 @@
   <p:clrMapOvr>
     <a:masterClrMapping/>
   </p:clrMapOvr>
+  <p:timing>
+    <p:tnLst>
+      <p:par>
+        <p:cTn id="1" dur="indefinite" restart="never" nodeType="tmRoot"/>
+      </p:par>
+    </p:tnLst>
+  </p:timing>
 </p:sld>
 </file>
 
@@ -5275,7 +5398,7 @@
   <p:timing>
     <p:tnLst>
       <p:par>
-        <p:cTn xmlns:p14="http://schemas.microsoft.com/office/powerpoint/2010/main" id="1" dur="indefinite" restart="never" nodeType="tmRoot">
+        <p:cTn id="1" dur="indefinite" restart="never" nodeType="tmRoot">
           <p:childTnLst>
             <p:seq concurrent="1" nextAc="seek">
               <p:cTn id="2" dur="indefinite" nodeType="mainSeq">
@@ -5385,6 +5508,291 @@
             <p:ph type="title"/>
           </p:nvPr>
         </p:nvSpPr>
+        <p:spPr>
+          <a:xfrm>
+            <a:off x="241300" y="274638"/>
+            <a:ext cx="8738021" cy="1143000"/>
+          </a:xfrm>
+        </p:spPr>
+        <p:txBody>
+          <a:bodyPr>
+            <a:normAutofit/>
+          </a:bodyPr>
+          <a:lstStyle/>
+          <a:p>
+            <a:pPr algn="l"/>
+            <a:r>
+              <a:rPr lang="en-US">
+                <a:solidFill>
+                  <a:srgbClr val="000000"/>
+                </a:solidFill>
+                <a:latin typeface="Calibri"/>
+              </a:rPr>
+              <a:t>Unix command: alias</a:t>
+            </a:r>
+          </a:p>
+        </p:txBody>
+      </p:sp>
+      <p:sp>
+        <p:nvSpPr>
+          <p:cNvPr id="3" name="TextBox 2"/>
+          <p:cNvSpPr txBox="1"/>
+          <p:nvPr/>
+        </p:nvSpPr>
+        <p:spPr>
+          <a:xfrm>
+            <a:off x="304800" y="1543050"/>
+            <a:ext cx="8691133" cy="2677656"/>
+          </a:xfrm>
+          <a:prstGeom prst="rect">
+            <a:avLst/>
+          </a:prstGeom>
+        </p:spPr>
+        <p:txBody>
+          <a:bodyPr rtlCol="0">
+            <a:spAutoFit/>
+          </a:bodyPr>
+          <a:lstStyle/>
+          <a:p>
+            <a:pPr marL="285750" indent="-285750">
+              <a:buFont typeface="Arial" panose="020B0604020202020204" pitchFamily="34" charset="0"/>
+              <a:buChar char="•"/>
+            </a:pPr>
+            <a:r>
+              <a:rPr lang="en-US" sz="2800" dirty="0"/>
+              <a:t>alias: avoid typing a long command sequence repeatedly</a:t>
+            </a:r>
+          </a:p>
+          <a:p>
+            <a:pPr marL="285750" indent="-285750">
+              <a:buFont typeface="Arial" panose="020B0604020202020204" pitchFamily="34" charset="0"/>
+              <a:buChar char="•"/>
+            </a:pPr>
+            <a:endParaRPr lang="en-US" sz="2800" dirty="0"/>
+          </a:p>
+          <a:p>
+            <a:pPr marL="457200" indent="-457200">
+              <a:buFont typeface="Arial" panose="020B0604020202020204" pitchFamily="34" charset="0"/>
+              <a:buChar char="•"/>
+            </a:pPr>
+            <a:r>
+              <a:rPr lang="en-US" sz="2800" dirty="0"/>
+              <a:t>Example: clean, compile, run</a:t>
+            </a:r>
+          </a:p>
+          <a:p>
+            <a:pPr lvl="1"/>
+            <a:r>
+              <a:rPr lang="en-US" sz="2800" dirty="0"/>
+              <a:t>    </a:t>
+            </a:r>
+            <a:r>
+              <a:rPr lang="en-US" sz="2800" dirty="0">
+                <a:solidFill>
+                  <a:srgbClr val="7F7F7F"/>
+                </a:solidFill>
+              </a:rPr>
+              <a:t>alias go='make clean; make; ./</a:t>
+            </a:r>
+            <a:r>
+              <a:rPr lang="en-US" sz="2800" dirty="0" err="1">
+                <a:solidFill>
+                  <a:srgbClr val="7F7F7F"/>
+                </a:solidFill>
+              </a:rPr>
+              <a:t>my_program</a:t>
+            </a:r>
+            <a:r>
+              <a:rPr lang="en-US" sz="2800" dirty="0">
+                <a:solidFill>
+                  <a:srgbClr val="7F7F7F"/>
+                </a:solidFill>
+              </a:rPr>
+              <a:t>'</a:t>
+            </a:r>
+          </a:p>
+          <a:p>
+            <a:pPr marL="457200" indent="-457200">
+              <a:buFont typeface="Arial" panose="020B0604020202020204" pitchFamily="34" charset="0"/>
+              <a:buChar char="•"/>
+            </a:pPr>
+            <a:r>
+              <a:rPr lang="en-US" sz="2800" dirty="0"/>
+              <a:t>Example: </a:t>
+            </a:r>
+            <a:r>
+              <a:rPr lang="en-US" sz="2800" dirty="0" err="1"/>
+              <a:t>ssh</a:t>
+            </a:r>
+            <a:r>
+              <a:rPr lang="en-US" sz="2800" dirty="0"/>
+              <a:t> to </a:t>
+            </a:r>
+            <a:r>
+              <a:rPr lang="en-US" sz="2800" dirty="0" smtClean="0"/>
+              <a:t>ix-</a:t>
+            </a:r>
+            <a:r>
+              <a:rPr lang="en-US" sz="2800" dirty="0" err="1" smtClean="0"/>
+              <a:t>dev</a:t>
+            </a:r>
+            <a:r>
+              <a:rPr lang="en-US" sz="2800" dirty="0" smtClean="0"/>
+              <a:t> </a:t>
+            </a:r>
+            <a:r>
+              <a:rPr lang="en-US" sz="2800" dirty="0"/>
+              <a:t>a lot</a:t>
+            </a:r>
+          </a:p>
+          <a:p>
+            <a:pPr lvl="1"/>
+            <a:r>
+              <a:rPr lang="en-US" sz="2800" dirty="0"/>
+              <a:t>    </a:t>
+            </a:r>
+            <a:r>
+              <a:rPr lang="en-US" sz="2800" dirty="0">
+                <a:solidFill>
+                  <a:srgbClr val="7F7F7F"/>
+                </a:solidFill>
+              </a:rPr>
+              <a:t>alias ix='</a:t>
+            </a:r>
+            <a:r>
+              <a:rPr lang="en-US" sz="2800" dirty="0" err="1">
+                <a:solidFill>
+                  <a:srgbClr val="7F7F7F"/>
+                </a:solidFill>
+              </a:rPr>
+              <a:t>ssh</a:t>
+            </a:r>
+            <a:r>
+              <a:rPr lang="en-US" sz="2800" dirty="0">
+                <a:solidFill>
+                  <a:srgbClr val="7F7F7F"/>
+                </a:solidFill>
+              </a:rPr>
+              <a:t> </a:t>
+            </a:r>
+            <a:r>
+              <a:rPr lang="en-US" sz="2800" dirty="0" err="1">
+                <a:solidFill>
+                  <a:srgbClr val="7F7F7F"/>
+                </a:solidFill>
+              </a:rPr>
+              <a:t>username@</a:t>
+            </a:r>
+            <a:r>
+              <a:rPr lang="en-US" sz="2800" dirty="0" err="1" smtClean="0">
+                <a:solidFill>
+                  <a:srgbClr val="7F7F7F"/>
+                </a:solidFill>
+              </a:rPr>
+              <a:t>ix-dev.cs.uoregon.edu</a:t>
+            </a:r>
+            <a:r>
+              <a:rPr lang="en-US" sz="2800" dirty="0">
+                <a:solidFill>
+                  <a:srgbClr val="7F7F7F"/>
+                </a:solidFill>
+              </a:rPr>
+              <a:t>'</a:t>
+            </a:r>
+          </a:p>
+        </p:txBody>
+      </p:sp>
+      <p:sp>
+        <p:nvSpPr>
+          <p:cNvPr id="4" name="TextBox 3"/>
+          <p:cNvSpPr txBox="1"/>
+          <p:nvPr/>
+        </p:nvSpPr>
+        <p:spPr>
+          <a:xfrm>
+            <a:off x="180975" y="4429125"/>
+            <a:ext cx="8452039" cy="830997"/>
+          </a:xfrm>
+          <a:prstGeom prst="rect">
+            <a:avLst/>
+          </a:prstGeom>
+        </p:spPr>
+        <p:txBody>
+          <a:bodyPr rtlCol="0">
+            <a:spAutoFit/>
+          </a:bodyPr>
+          <a:lstStyle/>
+          <a:p>
+            <a:r>
+              <a:rPr lang="en-US" sz="2400" dirty="0"/>
+              <a:t>Put an alias command (or anything else) in your ~/.</a:t>
+            </a:r>
+            <a:r>
+              <a:rPr lang="en-US" sz="2400" dirty="0" err="1"/>
+              <a:t>bashrc</a:t>
+            </a:r>
+            <a:r>
+              <a:rPr lang="en-US" sz="2400" dirty="0"/>
+              <a:t> file to make it persistent!  </a:t>
+            </a:r>
+            <a:r>
+              <a:rPr lang="en-US" sz="2400" dirty="0">
+                <a:solidFill>
+                  <a:srgbClr val="7F7F7F"/>
+                </a:solidFill>
+              </a:rPr>
+              <a:t>DEMO</a:t>
+            </a:r>
+          </a:p>
+        </p:txBody>
+      </p:sp>
+    </p:spTree>
+    <p:extLst>
+      <p:ext uri="{BB962C8B-B14F-4D97-AF65-F5344CB8AC3E}">
+        <p14:creationId xmlns:p14="http://schemas.microsoft.com/office/powerpoint/2010/main" val="353183349"/>
+      </p:ext>
+    </p:extLst>
+  </p:cSld>
+  <p:clrMapOvr>
+    <a:masterClrMapping/>
+  </p:clrMapOvr>
+  <p:timing>
+    <p:tnLst>
+      <p:par>
+        <p:cTn id="1" dur="indefinite" restart="never" nodeType="tmRoot"/>
+      </p:par>
+    </p:tnLst>
+  </p:timing>
+</p:sld>
+</file>
+
+<file path=ppt/slides/slide12.xml><?xml version="1.0" encoding="utf-8"?>
+<p:sld xmlns:a="http://schemas.openxmlformats.org/drawingml/2006/main" xmlns:r="http://schemas.openxmlformats.org/officeDocument/2006/relationships" xmlns:p="http://schemas.openxmlformats.org/presentationml/2006/main">
+  <p:cSld>
+    <p:spTree>
+      <p:nvGrpSpPr>
+        <p:cNvPr id="1" name=""/>
+        <p:cNvGrpSpPr/>
+        <p:nvPr/>
+      </p:nvGrpSpPr>
+      <p:grpSpPr>
+        <a:xfrm>
+          <a:off x="0" y="0"/>
+          <a:ext cx="0" cy="0"/>
+          <a:chOff x="0" y="0"/>
+          <a:chExt cx="0" cy="0"/>
+        </a:xfrm>
+      </p:grpSpPr>
+      <p:sp>
+        <p:nvSpPr>
+          <p:cNvPr id="2" name="Title 1"/>
+          <p:cNvSpPr>
+            <a:spLocks noGrp="1"/>
+          </p:cNvSpPr>
+          <p:nvPr>
+            <p:ph type="title"/>
+          </p:nvPr>
+        </p:nvSpPr>
         <p:spPr/>
         <p:txBody>
           <a:bodyPr/>
@@ -5463,10 +5871,17 @@
   <p:clrMapOvr>
     <a:masterClrMapping/>
   </p:clrMapOvr>
+  <p:timing>
+    <p:tnLst>
+      <p:par>
+        <p:cTn id="1" dur="indefinite" restart="never" nodeType="tmRoot"/>
+      </p:par>
+    </p:tnLst>
+  </p:timing>
 </p:sld>
 </file>
 
-<file path=ppt/slides/slide12.xml><?xml version="1.0" encoding="utf-8"?>
+<file path=ppt/slides/slide13.xml><?xml version="1.0" encoding="utf-8"?>
 <p:sld xmlns:a="http://schemas.openxmlformats.org/drawingml/2006/main" xmlns:r="http://schemas.openxmlformats.org/officeDocument/2006/relationships" xmlns:p="http://schemas.openxmlformats.org/presentationml/2006/main">
   <p:cSld>
     <p:spTree>
@@ -5663,7 +6078,7 @@
   <p:timing>
     <p:tnLst>
       <p:par>
-        <p:cTn xmlns:p14="http://schemas.microsoft.com/office/powerpoint/2010/main" id="1" dur="indefinite" restart="never" nodeType="tmRoot">
+        <p:cTn id="1" dur="indefinite" restart="never" nodeType="tmRoot">
           <p:childTnLst>
             <p:seq concurrent="1" nextAc="seek">
               <p:cTn id="2" dur="indefinite" nodeType="mainSeq">
@@ -5749,7 +6164,7 @@
 </p:sld>
 </file>
 
-<file path=ppt/slides/slide13.xml><?xml version="1.0" encoding="utf-8"?>
+<file path=ppt/slides/slide14.xml><?xml version="1.0" encoding="utf-8"?>
 <p:sld xmlns:a="http://schemas.openxmlformats.org/drawingml/2006/main" xmlns:r="http://schemas.openxmlformats.org/officeDocument/2006/relationships" xmlns:p="http://schemas.openxmlformats.org/presentationml/2006/main">
   <p:cSld>
     <p:spTree>
@@ -5829,141 +6244,13 @@
   <p:clrMapOvr>
     <a:masterClrMapping/>
   </p:clrMapOvr>
-</p:sld>
-</file>
-
-<file path=ppt/slides/slide14.xml><?xml version="1.0" encoding="utf-8"?>
-<p:sld xmlns:a="http://schemas.openxmlformats.org/drawingml/2006/main" xmlns:r="http://schemas.openxmlformats.org/officeDocument/2006/relationships" xmlns:p="http://schemas.openxmlformats.org/presentationml/2006/main">
-  <p:cSld>
-    <p:spTree>
-      <p:nvGrpSpPr>
-        <p:cNvPr id="1" name=""/>
-        <p:cNvGrpSpPr/>
-        <p:nvPr/>
-      </p:nvGrpSpPr>
-      <p:grpSpPr>
-        <a:xfrm>
-          <a:off x="0" y="0"/>
-          <a:ext cx="0" cy="0"/>
-          <a:chOff x="0" y="0"/>
-          <a:chExt cx="0" cy="0"/>
-        </a:xfrm>
-      </p:grpSpPr>
-      <p:sp>
-        <p:nvSpPr>
-          <p:cNvPr id="2" name="Title 1"/>
-          <p:cNvSpPr>
-            <a:spLocks noGrp="1"/>
-          </p:cNvSpPr>
-          <p:nvPr>
-            <p:ph type="title"/>
-          </p:nvPr>
-        </p:nvSpPr>
-        <p:spPr>
-          <a:xfrm>
-            <a:off x="241300" y="274638"/>
-            <a:ext cx="8738021" cy="1143000"/>
-          </a:xfrm>
-        </p:spPr>
-        <p:txBody>
-          <a:bodyPr>
-            <a:normAutofit fontScale="90000"/>
-          </a:bodyPr>
-          <a:lstStyle/>
-          <a:p>
-            <a:pPr algn="l"/>
-            <a:r>
-              <a:rPr lang="en-US"/>
-              <a:t>Example: difficult output from C program</a:t>
-            </a:r>
-          </a:p>
-        </p:txBody>
-      </p:sp>
-      <p:sp>
-        <p:nvSpPr>
-          <p:cNvPr id="3" name="Content Placeholder 2"/>
-          <p:cNvSpPr>
-            <a:spLocks noGrp="1"/>
-          </p:cNvSpPr>
-          <p:nvPr>
-            <p:ph idx="1"/>
-          </p:nvPr>
-        </p:nvSpPr>
-        <p:spPr/>
-        <p:txBody>
-          <a:bodyPr vert="horz" lIns="91440" tIns="45720" rIns="91440" bIns="45720" rtlCol="0" anchor="t">
-            <a:normAutofit/>
-          </a:bodyPr>
-          <a:lstStyle/>
-          <a:p>
-            <a:r>
-              <a:rPr lang="en-US"/>
-              <a:t>This one is harder! All of the output goes to </a:t>
-            </a:r>
-            <a:r>
-              <a:rPr lang="en-US" err="1"/>
-              <a:t>stdout</a:t>
-            </a:r>
-            <a:r>
-              <a:rPr lang="en-US"/>
-              <a:t>, but we still want to separate it. Use pipes, grep, and </a:t>
-            </a:r>
-            <a:r>
-              <a:rPr lang="en-US" err="1"/>
-              <a:t>sed</a:t>
-            </a:r>
-            <a:r>
-              <a:rPr lang="en-US"/>
-              <a:t> to sort the output into two files called </a:t>
-            </a:r>
-            <a:r>
-              <a:rPr lang="en-US" err="1"/>
-              <a:t>bad_log</a:t>
-            </a:r>
-            <a:r>
-              <a:rPr lang="en-US"/>
-              <a:t> and </a:t>
-            </a:r>
-            <a:r>
-              <a:rPr lang="en-US" err="1"/>
-              <a:t>good_log</a:t>
-            </a:r>
-            <a:r>
-              <a:rPr lang="en-US"/>
-              <a:t> … in </a:t>
-            </a:r>
-            <a:r>
-              <a:rPr lang="en-US" err="1"/>
-              <a:t>bad_log</a:t>
-            </a:r>
-            <a:r>
-              <a:rPr lang="en-US"/>
-              <a:t>, the word ERROR should be removed. It's ok to write to an intermediate file and do this in several steps.</a:t>
-            </a:r>
-          </a:p>
-          <a:p>
-            <a:r>
-              <a:rPr lang="en-US">
-                <a:solidFill>
-                  <a:srgbClr val="A5A5A5"/>
-                </a:solidFill>
-                <a:latin typeface="Calibri"/>
-              </a:rPr>
-              <a:t>DEMO</a:t>
-            </a:r>
-          </a:p>
-        </p:txBody>
-      </p:sp>
-    </p:spTree>
-    <p:extLst>
-      <p:ext uri="{BB962C8B-B14F-4D97-AF65-F5344CB8AC3E}">
-        <p14:creationId xmlns:p14="http://schemas.microsoft.com/office/powerpoint/2010/main" val="3959687060"/>
-      </p:ext>
-    </p:extLst>
-  </p:cSld>
-  <p:clrMapOvr>
-    <a:masterClrMapping/>
-  </p:clrMapOvr>
+  <p:timing>
+    <p:tnLst>
+      <p:par>
+        <p:cTn id="1" dur="indefinite" restart="never" nodeType="tmRoot"/>
+      </p:par>
+    </p:tnLst>
+  </p:timing>
 </p:sld>
 </file>
 
@@ -6032,8 +6319,155 @@
           <a:lstStyle/>
           <a:p>
             <a:r>
+              <a:rPr lang="en-US"/>
+              <a:t>This one is harder! All of the output goes to </a:t>
+            </a:r>
+            <a:r>
+              <a:rPr lang="en-US" err="1"/>
+              <a:t>stdout</a:t>
+            </a:r>
+            <a:r>
+              <a:rPr lang="en-US"/>
+              <a:t>, but we still want to separate it. Use pipes, grep, and </a:t>
+            </a:r>
+            <a:r>
+              <a:rPr lang="en-US" err="1"/>
+              <a:t>sed</a:t>
+            </a:r>
+            <a:r>
+              <a:rPr lang="en-US"/>
+              <a:t> to sort the output into two files called </a:t>
+            </a:r>
+            <a:r>
+              <a:rPr lang="en-US" err="1"/>
+              <a:t>bad_log</a:t>
+            </a:r>
+            <a:r>
+              <a:rPr lang="en-US"/>
+              <a:t> and </a:t>
+            </a:r>
+            <a:r>
+              <a:rPr lang="en-US" err="1"/>
+              <a:t>good_log</a:t>
+            </a:r>
+            <a:r>
+              <a:rPr lang="en-US"/>
+              <a:t> … in </a:t>
+            </a:r>
+            <a:r>
+              <a:rPr lang="en-US" err="1"/>
+              <a:t>bad_log</a:t>
+            </a:r>
+            <a:r>
+              <a:rPr lang="en-US"/>
+              <a:t>, the word ERROR should be removed. It's ok to write to an intermediate file and do this in several steps.</a:t>
+            </a:r>
+          </a:p>
+          <a:p>
+            <a:r>
               <a:rPr lang="en-US">
                 <a:solidFill>
+                  <a:srgbClr val="A5A5A5"/>
+                </a:solidFill>
+                <a:latin typeface="Calibri"/>
+              </a:rPr>
+              <a:t>DEMO</a:t>
+            </a:r>
+          </a:p>
+        </p:txBody>
+      </p:sp>
+    </p:spTree>
+    <p:extLst>
+      <p:ext uri="{BB962C8B-B14F-4D97-AF65-F5344CB8AC3E}">
+        <p14:creationId xmlns:p14="http://schemas.microsoft.com/office/powerpoint/2010/main" val="3959687060"/>
+      </p:ext>
+    </p:extLst>
+  </p:cSld>
+  <p:clrMapOvr>
+    <a:masterClrMapping/>
+  </p:clrMapOvr>
+  <p:timing>
+    <p:tnLst>
+      <p:par>
+        <p:cTn id="1" dur="indefinite" restart="never" nodeType="tmRoot"/>
+      </p:par>
+    </p:tnLst>
+  </p:timing>
+</p:sld>
+</file>
+
+<file path=ppt/slides/slide16.xml><?xml version="1.0" encoding="utf-8"?>
+<p:sld xmlns:a="http://schemas.openxmlformats.org/drawingml/2006/main" xmlns:r="http://schemas.openxmlformats.org/officeDocument/2006/relationships" xmlns:p="http://schemas.openxmlformats.org/presentationml/2006/main">
+  <p:cSld>
+    <p:spTree>
+      <p:nvGrpSpPr>
+        <p:cNvPr id="1" name=""/>
+        <p:cNvGrpSpPr/>
+        <p:nvPr/>
+      </p:nvGrpSpPr>
+      <p:grpSpPr>
+        <a:xfrm>
+          <a:off x="0" y="0"/>
+          <a:ext cx="0" cy="0"/>
+          <a:chOff x="0" y="0"/>
+          <a:chExt cx="0" cy="0"/>
+        </a:xfrm>
+      </p:grpSpPr>
+      <p:sp>
+        <p:nvSpPr>
+          <p:cNvPr id="2" name="Title 1"/>
+          <p:cNvSpPr>
+            <a:spLocks noGrp="1"/>
+          </p:cNvSpPr>
+          <p:nvPr>
+            <p:ph type="title"/>
+          </p:nvPr>
+        </p:nvSpPr>
+        <p:spPr>
+          <a:xfrm>
+            <a:off x="241300" y="274638"/>
+            <a:ext cx="8738021" cy="1143000"/>
+          </a:xfrm>
+        </p:spPr>
+        <p:txBody>
+          <a:bodyPr>
+            <a:normAutofit fontScale="90000"/>
+          </a:bodyPr>
+          <a:lstStyle/>
+          <a:p>
+            <a:pPr algn="l"/>
+            <a:r>
+              <a:rPr lang="en-US"/>
+              <a:t>Example: difficult output from C program</a:t>
+            </a:r>
+          </a:p>
+        </p:txBody>
+      </p:sp>
+      <p:sp>
+        <p:nvSpPr>
+          <p:cNvPr id="3" name="Content Placeholder 2"/>
+          <p:cNvSpPr>
+            <a:spLocks noGrp="1"/>
+          </p:cNvSpPr>
+          <p:nvPr>
+            <p:ph idx="1"/>
+          </p:nvPr>
+        </p:nvSpPr>
+        <p:spPr>
+          <a:xfrm>
+            <a:off x="457199" y="1600200"/>
+            <a:ext cx="8321041" cy="4525963"/>
+          </a:xfrm>
+        </p:spPr>
+        <p:txBody>
+          <a:bodyPr vert="horz" lIns="91440" tIns="45720" rIns="91440" bIns="45720" rtlCol="0" anchor="t">
+            <a:normAutofit fontScale="92500" lnSpcReduction="10000"/>
+          </a:bodyPr>
+          <a:lstStyle/>
+          <a:p>
+            <a:r>
+              <a:rPr lang="en-US" dirty="0">
+                <a:solidFill>
                   <a:srgbClr val="000000"/>
                 </a:solidFill>
                 <a:latin typeface="Calibri"/>
@@ -6044,7 +6478,7 @@
           <a:p>
             <a:pPr lvl="1"/>
             <a:r>
-              <a:rPr lang="en-US">
+              <a:rPr lang="en-US" dirty="0">
                 <a:solidFill>
                   <a:srgbClr val="7F7F7F"/>
                 </a:solidFill>
@@ -6053,7 +6487,7 @@
               <a:t>./</a:t>
             </a:r>
             <a:r>
-              <a:rPr lang="en-US" err="1">
+              <a:rPr lang="en-US" dirty="0" err="1">
                 <a:solidFill>
                   <a:srgbClr val="7F7F7F"/>
                 </a:solidFill>
@@ -6062,7 +6496,7 @@
               <a:t>unix_fun</a:t>
             </a:r>
             <a:r>
-              <a:rPr lang="en-US">
+              <a:rPr lang="en-US" dirty="0">
                 <a:solidFill>
                   <a:srgbClr val="7F7F7F"/>
                 </a:solidFill>
@@ -6074,7 +6508,7 @@
           <a:p>
             <a:pPr lvl="1"/>
             <a:r>
-              <a:rPr lang="en-US">
+              <a:rPr lang="en-US" dirty="0">
                 <a:solidFill>
                   <a:srgbClr val="7F7F7F"/>
                 </a:solidFill>
@@ -6083,7 +6517,7 @@
               <a:t>grep ERROR log | </a:t>
             </a:r>
             <a:r>
-              <a:rPr lang="en-US" err="1">
+              <a:rPr lang="en-US" dirty="0" err="1">
                 <a:solidFill>
                   <a:srgbClr val="7F7F7F"/>
                 </a:solidFill>
@@ -6092,7 +6526,7 @@
               <a:t>sed</a:t>
             </a:r>
             <a:r>
-              <a:rPr lang="en-US">
+              <a:rPr lang="en-US" dirty="0">
                 <a:solidFill>
                   <a:srgbClr val="7F7F7F"/>
                 </a:solidFill>
@@ -6101,7 +6535,7 @@
               <a:t> 's/ERROR //g' &gt; </a:t>
             </a:r>
             <a:r>
-              <a:rPr lang="en-US" err="1">
+              <a:rPr lang="en-US" dirty="0" err="1">
                 <a:solidFill>
                   <a:srgbClr val="7F7F7F"/>
                 </a:solidFill>
@@ -6109,11 +6543,17 @@
               </a:rPr>
               <a:t>bad_log</a:t>
             </a:r>
+            <a:endParaRPr lang="en-US" dirty="0">
+              <a:solidFill>
+                <a:srgbClr val="7F7F7F"/>
+              </a:solidFill>
+              <a:latin typeface="Calibri"/>
+            </a:endParaRPr>
           </a:p>
           <a:p>
             <a:pPr lvl="1"/>
             <a:r>
-              <a:rPr lang="en-US">
+              <a:rPr lang="en-US" dirty="0">
                 <a:solidFill>
                   <a:srgbClr val="7F7F7F"/>
                 </a:solidFill>
@@ -6122,7 +6562,7 @@
               <a:t>grep –v ERROR log &gt; </a:t>
             </a:r>
             <a:r>
-              <a:rPr lang="en-US" err="1">
+              <a:rPr lang="en-US" dirty="0" err="1">
                 <a:solidFill>
                   <a:srgbClr val="7F7F7F"/>
                 </a:solidFill>
@@ -6130,10 +6570,16 @@
               </a:rPr>
               <a:t>good_log</a:t>
             </a:r>
-          </a:p>
-          <a:p>
-            <a:r>
-              <a:rPr lang="en-US">
+            <a:endParaRPr lang="en-US" dirty="0">
+              <a:solidFill>
+                <a:srgbClr val="7F7F7F"/>
+              </a:solidFill>
+              <a:latin typeface="Calibri"/>
+            </a:endParaRPr>
+          </a:p>
+          <a:p>
+            <a:r>
+              <a:rPr lang="en-US" dirty="0">
                 <a:solidFill>
                   <a:srgbClr val="000000"/>
                 </a:solidFill>
@@ -6145,7 +6591,7 @@
           <a:p>
             <a:pPr lvl="1"/>
             <a:r>
-              <a:rPr lang="en-US">
+              <a:rPr lang="en-US" dirty="0">
                 <a:solidFill>
                   <a:srgbClr val="7F7F7F"/>
                 </a:solidFill>
@@ -6154,7 +6600,7 @@
               <a:t>./</a:t>
             </a:r>
             <a:r>
-              <a:rPr lang="en-US" err="1">
+              <a:rPr lang="en-US" dirty="0" err="1">
                 <a:solidFill>
                   <a:srgbClr val="7F7F7F"/>
                 </a:solidFill>
@@ -6163,7 +6609,7 @@
               <a:t>unix_fun</a:t>
             </a:r>
             <a:r>
-              <a:rPr lang="en-US">
+              <a:rPr lang="en-US" dirty="0">
                 <a:solidFill>
                   <a:srgbClr val="7F7F7F"/>
                 </a:solidFill>
@@ -6172,7 +6618,7 @@
               <a:t> | tee &gt;(grep ERROR | </a:t>
             </a:r>
             <a:r>
-              <a:rPr lang="en-US" err="1">
+              <a:rPr lang="en-US" dirty="0" err="1">
                 <a:solidFill>
                   <a:srgbClr val="7F7F7F"/>
                 </a:solidFill>
@@ -6181,7 +6627,7 @@
               <a:t>sed</a:t>
             </a:r>
             <a:r>
-              <a:rPr lang="en-US">
+              <a:rPr lang="en-US" dirty="0">
                 <a:solidFill>
                   <a:srgbClr val="7F7F7F"/>
                 </a:solidFill>
@@ -6190,7 +6636,7 @@
               <a:t> 's/ERROR //g' &gt; </a:t>
             </a:r>
             <a:r>
-              <a:rPr lang="en-US" err="1">
+              <a:rPr lang="en-US" dirty="0" err="1">
                 <a:solidFill>
                   <a:srgbClr val="7F7F7F"/>
                 </a:solidFill>
@@ -6199,7 +6645,7 @@
               <a:t>bad_log</a:t>
             </a:r>
             <a:r>
-              <a:rPr lang="en-US">
+              <a:rPr lang="en-US" dirty="0">
                 <a:solidFill>
                   <a:srgbClr val="7F7F7F"/>
                 </a:solidFill>
@@ -6208,7 +6654,7 @@
               <a:t>) &gt;(grep -v ERROR &gt; </a:t>
             </a:r>
             <a:r>
-              <a:rPr lang="en-US" err="1">
+              <a:rPr lang="en-US" dirty="0" err="1">
                 <a:solidFill>
                   <a:srgbClr val="7F7F7F"/>
                 </a:solidFill>
@@ -6217,7 +6663,7 @@
               <a:t>good_log</a:t>
             </a:r>
             <a:r>
-              <a:rPr lang="en-US">
+              <a:rPr lang="en-US" dirty="0" smtClean="0">
                 <a:solidFill>
                   <a:srgbClr val="7F7F7F"/>
                 </a:solidFill>
@@ -6225,6 +6671,176 @@
               </a:rPr>
               <a:t>)</a:t>
             </a:r>
+          </a:p>
+          <a:p>
+            <a:r>
+              <a:rPr lang="en-US" dirty="0">
+                <a:solidFill>
+                  <a:srgbClr val="000000"/>
+                </a:solidFill>
+                <a:latin typeface="Calibri"/>
+              </a:rPr>
+              <a:t>Check: Each line in </a:t>
+            </a:r>
+            <a:r>
+              <a:rPr lang="en-US" dirty="0" err="1">
+                <a:solidFill>
+                  <a:srgbClr val="000000"/>
+                </a:solidFill>
+                <a:latin typeface="Calibri"/>
+              </a:rPr>
+              <a:t>bad_log</a:t>
+            </a:r>
+            <a:r>
+              <a:rPr lang="en-US" dirty="0">
+                <a:solidFill>
+                  <a:srgbClr val="000000"/>
+                </a:solidFill>
+                <a:latin typeface="Calibri"/>
+              </a:rPr>
+              <a:t> should have a ‘9’ </a:t>
+            </a:r>
+            <a:r>
+              <a:rPr lang="en-US" dirty="0" smtClean="0">
+                <a:solidFill>
+                  <a:srgbClr val="000000"/>
+                </a:solidFill>
+                <a:latin typeface="Calibri"/>
+              </a:rPr>
+              <a:t>digit</a:t>
+            </a:r>
+          </a:p>
+          <a:p>
+            <a:pPr lvl="1"/>
+            <a:r>
+              <a:rPr lang="en-US" dirty="0">
+                <a:solidFill>
+                  <a:srgbClr val="7F7F7F"/>
+                </a:solidFill>
+                <a:latin typeface="Calibri"/>
+              </a:rPr>
+              <a:t>cat </a:t>
+            </a:r>
+            <a:r>
+              <a:rPr lang="en-US" dirty="0" err="1">
+                <a:solidFill>
+                  <a:srgbClr val="7F7F7F"/>
+                </a:solidFill>
+                <a:latin typeface="Calibri"/>
+              </a:rPr>
+              <a:t>bad_log</a:t>
+            </a:r>
+            <a:r>
+              <a:rPr lang="en-US" dirty="0">
+                <a:solidFill>
+                  <a:srgbClr val="7F7F7F"/>
+                </a:solidFill>
+                <a:latin typeface="Calibri"/>
+              </a:rPr>
+              <a:t> | grep ‘[9]’ | </a:t>
+            </a:r>
+            <a:r>
+              <a:rPr lang="en-US" dirty="0" err="1">
+                <a:solidFill>
+                  <a:srgbClr val="7F7F7F"/>
+                </a:solidFill>
+                <a:latin typeface="Calibri"/>
+              </a:rPr>
+              <a:t>wc</a:t>
+            </a:r>
+            <a:r>
+              <a:rPr lang="en-US" dirty="0">
+                <a:solidFill>
+                  <a:srgbClr val="7F7F7F"/>
+                </a:solidFill>
+                <a:latin typeface="Calibri"/>
+              </a:rPr>
+              <a:t> –l  </a:t>
+            </a:r>
+            <a:r>
+              <a:rPr lang="en-US" dirty="0" smtClean="0">
+                <a:solidFill>
+                  <a:srgbClr val="000000"/>
+                </a:solidFill>
+                <a:latin typeface="Calibri"/>
+              </a:rPr>
+              <a:t>(this equals 6025)</a:t>
+            </a:r>
+          </a:p>
+          <a:p>
+            <a:pPr lvl="1"/>
+            <a:r>
+              <a:rPr lang="en-US" dirty="0">
+                <a:solidFill>
+                  <a:srgbClr val="7F7F7F"/>
+                </a:solidFill>
+                <a:latin typeface="Calibri"/>
+              </a:rPr>
+              <a:t>cat </a:t>
+            </a:r>
+            <a:r>
+              <a:rPr lang="en-US" dirty="0" err="1">
+                <a:solidFill>
+                  <a:srgbClr val="7F7F7F"/>
+                </a:solidFill>
+                <a:latin typeface="Calibri"/>
+              </a:rPr>
+              <a:t>bad_log</a:t>
+            </a:r>
+            <a:r>
+              <a:rPr lang="en-US" dirty="0">
+                <a:solidFill>
+                  <a:srgbClr val="7F7F7F"/>
+                </a:solidFill>
+                <a:latin typeface="Calibri"/>
+              </a:rPr>
+              <a:t> | </a:t>
+            </a:r>
+            <a:r>
+              <a:rPr lang="en-US" dirty="0" err="1">
+                <a:solidFill>
+                  <a:srgbClr val="7F7F7F"/>
+                </a:solidFill>
+                <a:latin typeface="Calibri"/>
+              </a:rPr>
+              <a:t>wc</a:t>
+            </a:r>
+            <a:r>
+              <a:rPr lang="en-US" dirty="0">
+                <a:solidFill>
+                  <a:srgbClr val="7F7F7F"/>
+                </a:solidFill>
+                <a:latin typeface="Calibri"/>
+              </a:rPr>
+              <a:t> -l  </a:t>
+            </a:r>
+            <a:r>
+              <a:rPr lang="en-US" dirty="0" smtClean="0">
+                <a:solidFill>
+                  <a:srgbClr val="000000"/>
+                </a:solidFill>
+                <a:latin typeface="Calibri"/>
+              </a:rPr>
+              <a:t>(this also equals 6025 – good!)</a:t>
+            </a:r>
+            <a:endParaRPr lang="en-US" dirty="0">
+              <a:solidFill>
+                <a:srgbClr val="000000"/>
+              </a:solidFill>
+              <a:latin typeface="Calibri"/>
+            </a:endParaRPr>
+          </a:p>
+          <a:p>
+            <a:pPr marL="342900" lvl="1" indent="-342900">
+              <a:buFont typeface="Arial"/>
+              <a:buChar char="•"/>
+            </a:pPr>
+            <a:endParaRPr lang="en-US" sz="3200" dirty="0">
+              <a:solidFill>
+                <a:srgbClr val="000000"/>
+              </a:solidFill>
+              <a:latin typeface="Calibri"/>
+            </a:endParaRPr>
           </a:p>
         </p:txBody>
       </p:sp>
@@ -6238,10 +6854,17 @@
   <p:clrMapOvr>
     <a:masterClrMapping/>
   </p:clrMapOvr>
+  <p:timing>
+    <p:tnLst>
+      <p:par>
+        <p:cTn id="1" dur="indefinite" restart="never" nodeType="tmRoot"/>
+      </p:par>
+    </p:tnLst>
+  </p:timing>
 </p:sld>
 </file>
 
-<file path=ppt/slides/slide16.xml><?xml version="1.0" encoding="utf-8"?>
+<file path=ppt/slides/slide17.xml><?xml version="1.0" encoding="utf-8"?>
 <p:sld xmlns:a="http://schemas.openxmlformats.org/drawingml/2006/main" xmlns:r="http://schemas.openxmlformats.org/officeDocument/2006/relationships" xmlns:p="http://schemas.openxmlformats.org/presentationml/2006/main">
   <p:cSld>
     <p:spTree>
@@ -6388,165 +7011,13 @@
   <p:clrMapOvr>
     <a:masterClrMapping/>
   </p:clrMapOvr>
-</p:sld>
-</file>
-
-<file path=ppt/slides/slide17.xml><?xml version="1.0" encoding="utf-8"?>
-<p:sld xmlns:a="http://schemas.openxmlformats.org/drawingml/2006/main" xmlns:r="http://schemas.openxmlformats.org/officeDocument/2006/relationships" xmlns:p="http://schemas.openxmlformats.org/presentationml/2006/main">
-  <p:cSld>
-    <p:spTree>
-      <p:nvGrpSpPr>
-        <p:cNvPr id="1" name=""/>
-        <p:cNvGrpSpPr/>
-        <p:nvPr/>
-      </p:nvGrpSpPr>
-      <p:grpSpPr>
-        <a:xfrm>
-          <a:off x="0" y="0"/>
-          <a:ext cx="0" cy="0"/>
-          <a:chOff x="0" y="0"/>
-          <a:chExt cx="0" cy="0"/>
-        </a:xfrm>
-      </p:grpSpPr>
-      <p:sp>
-        <p:nvSpPr>
-          <p:cNvPr id="2" name="Title 1"/>
-          <p:cNvSpPr>
-            <a:spLocks noGrp="1"/>
-          </p:cNvSpPr>
-          <p:nvPr>
-            <p:ph type="title"/>
-          </p:nvPr>
-        </p:nvSpPr>
-        <p:spPr>
-          <a:xfrm>
-            <a:off x="241300" y="274638"/>
-            <a:ext cx="8738021" cy="1143000"/>
-          </a:xfrm>
-        </p:spPr>
-        <p:txBody>
-          <a:bodyPr>
-            <a:normAutofit/>
-          </a:bodyPr>
-          <a:lstStyle/>
-          <a:p>
-            <a:pPr algn="l"/>
-            <a:r>
-              <a:rPr lang="en-US" dirty="0">
-                <a:solidFill>
-                  <a:srgbClr val="000000"/>
-                </a:solidFill>
-                <a:latin typeface="Calibri"/>
-              </a:rPr>
-              <a:t>Unix command: curl</a:t>
-            </a:r>
-          </a:p>
-        </p:txBody>
-      </p:sp>
-      <p:sp>
-        <p:nvSpPr>
-          <p:cNvPr id="6" name="Content Placeholder 5"/>
-          <p:cNvSpPr>
-            <a:spLocks noGrp="1"/>
-          </p:cNvSpPr>
-          <p:nvPr>
-            <p:ph idx="1"/>
-          </p:nvPr>
-        </p:nvSpPr>
-        <p:spPr>
-          <a:xfrm>
-            <a:off x="457200" y="1600200"/>
-            <a:ext cx="8229600" cy="2933347"/>
-          </a:xfrm>
-        </p:spPr>
-        <p:txBody>
-          <a:bodyPr vert="horz" lIns="91440" tIns="45720" rIns="91440" bIns="45720" rtlCol="0" anchor="t">
-            <a:normAutofit fontScale="92500" lnSpcReduction="20000"/>
-          </a:bodyPr>
-          <a:lstStyle/>
-          <a:p>
-            <a:r>
-              <a:rPr lang="en-US"/>
-              <a:t>curl: transfer a URL … from 'man curl': curl offers a busload of useful tricks!</a:t>
-            </a:r>
-          </a:p>
-          <a:p>
-            <a:r>
-              <a:rPr lang="en-US"/>
-              <a:t>good for downloading stuff right in the terminal or onto ix</a:t>
-            </a:r>
-          </a:p>
-          <a:p>
-            <a:r>
-              <a:rPr lang="en-US">
-                <a:solidFill>
-                  <a:srgbClr val="000000"/>
-                </a:solidFill>
-                <a:latin typeface="Calibri"/>
-              </a:rPr>
-              <a:t>example: curl -</a:t>
-            </a:r>
-            <a:r>
-              <a:rPr lang="en-US" err="1">
-                <a:solidFill>
-                  <a:srgbClr val="000000"/>
-                </a:solidFill>
-                <a:latin typeface="Calibri"/>
-              </a:rPr>
-              <a:t>i</a:t>
-            </a:r>
-            <a:r>
-              <a:rPr lang="en-US">
-                <a:solidFill>
-                  <a:srgbClr val="000000"/>
-                </a:solidFill>
-                <a:latin typeface="Calibri"/>
-              </a:rPr>
-              <a:t> google.com</a:t>
-            </a:r>
-          </a:p>
-          <a:p>
-            <a:pPr lvl="1"/>
-            <a:r>
-              <a:rPr lang="en-US">
-                <a:solidFill>
-                  <a:srgbClr val="000000"/>
-                </a:solidFill>
-                <a:latin typeface="Calibri"/>
-              </a:rPr>
-              <a:t>the UO wireless doesn't work well with </a:t>
-            </a:r>
-            <a:r>
-              <a:rPr lang="en-US" err="1">
-                <a:solidFill>
-                  <a:srgbClr val="000000"/>
-                </a:solidFill>
-                <a:latin typeface="Calibri"/>
-              </a:rPr>
-              <a:t>linux</a:t>
-            </a:r>
-            <a:r>
-              <a:rPr lang="en-US">
-                <a:solidFill>
-                  <a:srgbClr val="000000"/>
-                </a:solidFill>
-                <a:latin typeface="Calibri"/>
-              </a:rPr>
-              <a:t>, so this is how I have to log on to it :(</a:t>
-            </a:r>
-          </a:p>
-        </p:txBody>
-      </p:sp>
-    </p:spTree>
-    <p:extLst>
-      <p:ext uri="{BB962C8B-B14F-4D97-AF65-F5344CB8AC3E}">
-        <p14:creationId xmlns:p14="http://schemas.microsoft.com/office/powerpoint/2010/main" val="2171720042"/>
-      </p:ext>
-    </p:extLst>
-  </p:cSld>
-  <p:clrMapOvr>
-    <a:masterClrMapping/>
-  </p:clrMapOvr>
+  <p:timing>
+    <p:tnLst>
+      <p:par>
+        <p:cTn id="1" dur="indefinite" restart="never" nodeType="tmRoot"/>
+      </p:par>
+    </p:tnLst>
+  </p:timing>
 </p:sld>
 </file>
 
@@ -6577,145 +7048,142 @@
             <p:ph type="title"/>
           </p:nvPr>
         </p:nvSpPr>
-        <p:spPr/>
-        <p:txBody>
-          <a:bodyPr/>
-          <a:lstStyle/>
-          <a:p>
-            <a:r>
-              <a:rPr lang="en-US"/>
-              <a:t>Wildcards</a:t>
-            </a:r>
-          </a:p>
-        </p:txBody>
-      </p:sp>
-      <p:sp>
-        <p:nvSpPr>
-          <p:cNvPr id="3" name="Content Placeholder 2"/>
-          <p:cNvSpPr>
-            <a:spLocks noGrp="1"/>
-          </p:cNvSpPr>
-          <p:nvPr>
-            <p:ph idx="1"/>
-          </p:nvPr>
-        </p:nvSpPr>
-        <p:spPr/>
-        <p:txBody>
-          <a:bodyPr/>
-          <a:lstStyle/>
-          <a:p>
-            <a:r>
-              <a:rPr lang="en-US"/>
-              <a:t>‘*’ is a wildcard with </a:t>
-            </a:r>
-            <a:r>
-              <a:rPr lang="en-US" err="1"/>
-              <a:t>unix</a:t>
-            </a:r>
-            <a:r>
-              <a:rPr lang="en-US"/>
-              <a:t> shells</a:t>
-            </a:r>
-          </a:p>
-          <a:p>
-            <a:endParaRPr lang="en-US"/>
-          </a:p>
-        </p:txBody>
-      </p:sp>
-      <p:pic>
-        <p:nvPicPr>
-          <p:cNvPr id="5" name="Picture 4" descr="Screen shot 2016-04-14 at 8.04.29 PM.png"/>
-          <p:cNvPicPr>
-            <a:picLocks noChangeAspect="1"/>
-          </p:cNvPicPr>
-          <p:nvPr/>
-        </p:nvPicPr>
-        <p:blipFill>
-          <a:blip r:embed="rId2">
-            <a:extLst>
-              <a:ext uri="{28A0092B-C50C-407E-A947-70E740481C1C}">
-                <a14:useLocalDpi xmlns:a14="http://schemas.microsoft.com/office/drawing/2010/main" val="0"/>
-              </a:ext>
-            </a:extLst>
-          </a:blip>
-          <a:stretch>
-            <a:fillRect/>
-          </a:stretch>
-        </p:blipFill>
         <p:spPr>
           <a:xfrm>
-            <a:off x="793711" y="2306622"/>
-            <a:ext cx="6215226" cy="3709903"/>
+            <a:off x="241300" y="274638"/>
+            <a:ext cx="8738021" cy="1143000"/>
           </a:xfrm>
-          <a:prstGeom prst="rect">
-            <a:avLst/>
-          </a:prstGeom>
         </p:spPr>
-      </p:pic>
-      <p:sp>
-        <p:nvSpPr>
-          <p:cNvPr id="6" name="Rounded Rectangle 5"/>
-          <p:cNvSpPr/>
-          <p:nvPr/>
+        <p:txBody>
+          <a:bodyPr>
+            <a:normAutofit/>
+          </a:bodyPr>
+          <a:lstStyle/>
+          <a:p>
+            <a:pPr algn="l"/>
+            <a:r>
+              <a:rPr lang="en-US" dirty="0">
+                <a:solidFill>
+                  <a:srgbClr val="000000"/>
+                </a:solidFill>
+                <a:latin typeface="Calibri"/>
+              </a:rPr>
+              <a:t>Unix </a:t>
+            </a:r>
+            <a:r>
+              <a:rPr lang="en-US" dirty="0" smtClean="0">
+                <a:solidFill>
+                  <a:srgbClr val="000000"/>
+                </a:solidFill>
+                <a:latin typeface="Calibri"/>
+              </a:rPr>
+              <a:t>commands: curl</a:t>
+            </a:r>
+            <a:endParaRPr lang="en-US" dirty="0">
+              <a:solidFill>
+                <a:srgbClr val="000000"/>
+              </a:solidFill>
+              <a:latin typeface="Calibri"/>
+            </a:endParaRPr>
+          </a:p>
+        </p:txBody>
+      </p:sp>
+      <p:sp>
+        <p:nvSpPr>
+          <p:cNvPr id="6" name="Content Placeholder 5"/>
+          <p:cNvSpPr>
+            <a:spLocks noGrp="1"/>
+          </p:cNvSpPr>
+          <p:nvPr>
+            <p:ph idx="1"/>
+          </p:nvPr>
         </p:nvSpPr>
         <p:spPr>
           <a:xfrm>
-            <a:off x="978509" y="6214476"/>
-            <a:ext cx="7168445" cy="643524"/>
+            <a:off x="457200" y="1600200"/>
+            <a:ext cx="8366760" cy="2933347"/>
           </a:xfrm>
-          <a:prstGeom prst="roundRect">
-            <a:avLst/>
-          </a:prstGeom>
-          <a:gradFill>
-            <a:gsLst>
-              <a:gs pos="0">
-                <a:srgbClr val="FFFF3E"/>
-              </a:gs>
-              <a:gs pos="100000">
-                <a:srgbClr val="FFFFCA"/>
-              </a:gs>
-            </a:gsLst>
-          </a:gradFill>
-          <a:ln w="76200" cmpd="tri">
-            <a:solidFill>
-              <a:schemeClr val="tx1"/>
-            </a:solidFill>
-          </a:ln>
         </p:spPr>
-        <p:style>
-          <a:lnRef idx="1">
-            <a:schemeClr val="accent1"/>
-          </a:lnRef>
-          <a:fillRef idx="3">
-            <a:schemeClr val="accent1"/>
-          </a:fillRef>
-          <a:effectRef idx="2">
-            <a:schemeClr val="accent1"/>
-          </a:effectRef>
-          <a:fontRef idx="minor">
-            <a:schemeClr val="lt1"/>
-          </a:fontRef>
-        </p:style>
-        <p:txBody>
-          <a:bodyPr rtlCol="0" anchor="ctr"/>
-          <a:lstStyle/>
-          <a:p>
-            <a:pPr algn="ctr"/>
-            <a:r>
-              <a:rPr lang="en-US" sz="2400">
-                <a:solidFill>
-                  <a:schemeClr val="tx1"/>
-                </a:solidFill>
-              </a:rPr>
-              <a:t>‘?’ is a wildcard that matches exactly one character</a:t>
-            </a:r>
+        <p:txBody>
+          <a:bodyPr vert="horz" lIns="91440" tIns="45720" rIns="91440" bIns="45720" rtlCol="0" anchor="t">
+            <a:normAutofit fontScale="92500"/>
+          </a:bodyPr>
+          <a:lstStyle/>
+          <a:p>
+            <a:r>
+              <a:rPr lang="en-US" dirty="0" smtClean="0">
+                <a:solidFill>
+                  <a:srgbClr val="000000"/>
+                </a:solidFill>
+                <a:latin typeface="Calibri"/>
+              </a:rPr>
+              <a:t>QUESTION: What’s the weather going to be like tomorrow in Eugene?</a:t>
+            </a:r>
+          </a:p>
+          <a:p>
+            <a:r>
+              <a:rPr lang="en-US" dirty="0" smtClean="0">
+                <a:solidFill>
+                  <a:srgbClr val="000000"/>
+                </a:solidFill>
+                <a:latin typeface="Calibri"/>
+              </a:rPr>
+              <a:t>BUT: </a:t>
+            </a:r>
+            <a:r>
+              <a:rPr lang="en-US" dirty="0" smtClean="0">
+                <a:solidFill>
+                  <a:srgbClr val="000000"/>
+                </a:solidFill>
+                <a:latin typeface="Calibri"/>
+              </a:rPr>
+              <a:t>You can only use your terminal to find out </a:t>
+            </a:r>
+            <a:r>
+              <a:rPr lang="en-US" dirty="0" smtClean="0">
+                <a:solidFill>
+                  <a:srgbClr val="000000"/>
+                </a:solidFill>
+                <a:latin typeface="Calibri"/>
+                <a:sym typeface="Wingdings"/>
+              </a:rPr>
+              <a:t> </a:t>
+            </a:r>
+          </a:p>
+          <a:p>
+            <a:endParaRPr lang="en-US" dirty="0">
+              <a:solidFill>
+                <a:srgbClr val="000000"/>
+              </a:solidFill>
+              <a:latin typeface="Calibri"/>
+              <a:sym typeface="Wingdings"/>
+            </a:endParaRPr>
+          </a:p>
+          <a:p>
+            <a:pPr marL="342900" lvl="1" indent="-342900">
+              <a:buFont typeface="Arial"/>
+              <a:buChar char="•"/>
+            </a:pPr>
+            <a:r>
+              <a:rPr lang="en-US" dirty="0" smtClean="0">
+                <a:solidFill>
+                  <a:srgbClr val="7F7F7F"/>
+                </a:solidFill>
+              </a:rPr>
+              <a:t>DEMO</a:t>
+            </a:r>
+            <a:endParaRPr lang="en-US" dirty="0">
+              <a:solidFill>
+                <a:srgbClr val="7F7F7F"/>
+              </a:solidFill>
+            </a:endParaRPr>
           </a:p>
         </p:txBody>
       </p:sp>
     </p:spTree>
     <p:extLst>
       <p:ext uri="{BB962C8B-B14F-4D97-AF65-F5344CB8AC3E}">
-        <p14:creationId xmlns:p14="http://schemas.microsoft.com/office/powerpoint/2010/main" val="2489502866"/>
+        <p14:creationId xmlns:p14="http://schemas.microsoft.com/office/powerpoint/2010/main" val="2171720042"/>
       </p:ext>
     </p:extLst>
   </p:cSld>
@@ -6725,88 +7193,9 @@
   <p:timing>
     <p:tnLst>
       <p:par>
-        <p:cTn xmlns:p14="http://schemas.microsoft.com/office/powerpoint/2010/main" id="1" dur="indefinite" restart="never" nodeType="tmRoot">
-          <p:childTnLst>
-            <p:seq concurrent="1" nextAc="seek">
-              <p:cTn id="2" dur="indefinite" nodeType="mainSeq">
-                <p:childTnLst>
-                  <p:par>
-                    <p:cTn id="3" fill="hold">
-                      <p:stCondLst>
-                        <p:cond delay="indefinite"/>
-                      </p:stCondLst>
-                      <p:childTnLst>
-                        <p:par>
-                          <p:cTn id="4" fill="hold">
-                            <p:stCondLst>
-                              <p:cond delay="0"/>
-                            </p:stCondLst>
-                            <p:childTnLst>
-                              <p:par>
-                                <p:cTn id="5" presetID="22" presetClass="entr" presetSubtype="1" fill="hold" grpId="0" nodeType="clickEffect">
-                                  <p:stCondLst>
-                                    <p:cond delay="0"/>
-                                  </p:stCondLst>
-                                  <p:childTnLst>
-                                    <p:set>
-                                      <p:cBhvr>
-                                        <p:cTn id="6" dur="1" fill="hold">
-                                          <p:stCondLst>
-                                            <p:cond delay="0"/>
-                                          </p:stCondLst>
-                                        </p:cTn>
-                                        <p:tgtEl>
-                                          <p:spTgt spid="6"/>
-                                        </p:tgtEl>
-                                        <p:attrNameLst>
-                                          <p:attrName>style.visibility</p:attrName>
-                                        </p:attrNameLst>
-                                      </p:cBhvr>
-                                      <p:to>
-                                        <p:strVal val="visible"/>
-                                      </p:to>
-                                    </p:set>
-                                    <p:animEffect transition="in" filter="wipe(up)">
-                                      <p:cBhvr>
-                                        <p:cTn id="7" dur="500"/>
-                                        <p:tgtEl>
-                                          <p:spTgt spid="6"/>
-                                        </p:tgtEl>
-                                      </p:cBhvr>
-                                    </p:animEffect>
-                                  </p:childTnLst>
-                                </p:cTn>
-                              </p:par>
-                            </p:childTnLst>
-                          </p:cTn>
-                        </p:par>
-                      </p:childTnLst>
-                    </p:cTn>
-                  </p:par>
-                </p:childTnLst>
-              </p:cTn>
-              <p:prevCondLst>
-                <p:cond evt="onPrev" delay="0">
-                  <p:tgtEl>
-                    <p:sldTgt/>
-                  </p:tgtEl>
-                </p:cond>
-              </p:prevCondLst>
-              <p:nextCondLst>
-                <p:cond evt="onNext" delay="0">
-                  <p:tgtEl>
-                    <p:sldTgt/>
-                  </p:tgtEl>
-                </p:cond>
-              </p:nextCondLst>
-            </p:seq>
-          </p:childTnLst>
-        </p:cTn>
+        <p:cTn id="1" dur="indefinite" restart="never" nodeType="tmRoot"/>
       </p:par>
     </p:tnLst>
-    <p:bldLst>
-      <p:bldP spid="6" grpId="0" animBg="1"/>
-    </p:bldLst>
   </p:timing>
 </p:sld>
 </file>
@@ -6852,20 +7241,35 @@
           <a:p>
             <a:pPr algn="l"/>
             <a:r>
-              <a:rPr lang="en-US">
+              <a:rPr lang="en-US" dirty="0">
                 <a:solidFill>
                   <a:srgbClr val="000000"/>
                 </a:solidFill>
                 <a:latin typeface="Calibri"/>
               </a:rPr>
-              <a:t>Example: curl</a:t>
-            </a:r>
-          </a:p>
-        </p:txBody>
-      </p:sp>
-      <p:sp>
-        <p:nvSpPr>
-          <p:cNvPr id="3" name="Content Placeholder 2"/>
+              <a:t>Unix </a:t>
+            </a:r>
+            <a:r>
+              <a:rPr lang="en-US" dirty="0" smtClean="0">
+                <a:solidFill>
+                  <a:srgbClr val="000000"/>
+                </a:solidFill>
+                <a:latin typeface="Calibri"/>
+              </a:rPr>
+              <a:t>commands: curl</a:t>
+            </a:r>
+            <a:endParaRPr lang="en-US" dirty="0">
+              <a:solidFill>
+                <a:srgbClr val="000000"/>
+              </a:solidFill>
+              <a:latin typeface="Calibri"/>
+            </a:endParaRPr>
+          </a:p>
+        </p:txBody>
+      </p:sp>
+      <p:sp>
+        <p:nvSpPr>
+          <p:cNvPr id="6" name="Content Placeholder 5"/>
           <p:cNvSpPr>
             <a:spLocks noGrp="1"/>
           </p:cNvSpPr>
@@ -6873,33 +7277,168 @@
             <p:ph idx="1"/>
           </p:nvPr>
         </p:nvSpPr>
-        <p:spPr/>
+        <p:spPr>
+          <a:xfrm>
+            <a:off x="457200" y="1600200"/>
+            <a:ext cx="8229600" cy="2933347"/>
+          </a:xfrm>
+        </p:spPr>
         <p:txBody>
           <a:bodyPr vert="horz" lIns="91440" tIns="45720" rIns="91440" bIns="45720" rtlCol="0" anchor="t">
-            <a:normAutofit/>
+            <a:normAutofit fontScale="77500" lnSpcReduction="20000"/>
           </a:bodyPr>
           <a:lstStyle/>
           <a:p>
             <a:r>
-              <a:rPr lang="en-US"/>
-              <a:t>let's download some of the CIS 330 lecture slides and tar just the PDFs</a:t>
+              <a:rPr lang="en-US" dirty="0" smtClean="0"/>
+              <a:t>Interact with remote servers, view and parse webpage content</a:t>
+            </a:r>
+            <a:r>
+              <a:rPr lang="en-US" dirty="0" smtClean="0"/>
+              <a:t> …and many more options!</a:t>
+            </a:r>
+            <a:endParaRPr lang="en-US" dirty="0"/>
+          </a:p>
+          <a:p>
+            <a:r>
+              <a:rPr lang="en-US" dirty="0" smtClean="0"/>
+              <a:t>Great</a:t>
+            </a:r>
+            <a:r>
+              <a:rPr lang="en-US" dirty="0" smtClean="0"/>
+              <a:t> </a:t>
+            </a:r>
+            <a:r>
+              <a:rPr lang="en-US" dirty="0"/>
+              <a:t>for downloading </a:t>
+            </a:r>
+            <a:r>
+              <a:rPr lang="en-US" dirty="0" smtClean="0"/>
+              <a:t>files (pdfs, .c/.h files,</a:t>
+            </a:r>
+            <a:r>
+              <a:rPr lang="is-IS" dirty="0" smtClean="0"/>
+              <a:t>…)</a:t>
+            </a:r>
+            <a:r>
+              <a:rPr lang="en-US" dirty="0" smtClean="0"/>
+              <a:t> </a:t>
+            </a:r>
+            <a:r>
+              <a:rPr lang="en-US" dirty="0"/>
+              <a:t>right </a:t>
+            </a:r>
+            <a:r>
+              <a:rPr lang="en-US" dirty="0" smtClean="0"/>
+              <a:t>inside </a:t>
+            </a:r>
+            <a:r>
+              <a:rPr lang="en-US" dirty="0"/>
+              <a:t>the </a:t>
+            </a:r>
+            <a:r>
+              <a:rPr lang="en-US" dirty="0" smtClean="0"/>
+              <a:t>terminal</a:t>
             </a:r>
           </a:p>
           <a:p>
             <a:pPr lvl="1"/>
             <a:r>
-              <a:rPr lang="en-US">
-                <a:solidFill>
-                  <a:srgbClr val="7F7F7F"/>
+              <a:rPr lang="en-US" dirty="0" smtClean="0"/>
+              <a:t>If I can get the link/</a:t>
+            </a:r>
+            <a:r>
+              <a:rPr lang="en-US" dirty="0" err="1" smtClean="0"/>
+              <a:t>url</a:t>
+            </a:r>
+            <a:r>
+              <a:rPr lang="en-US" dirty="0" smtClean="0"/>
+              <a:t> of the file, I always do it this way!</a:t>
+            </a:r>
+            <a:endParaRPr lang="en-US" dirty="0" smtClean="0"/>
+          </a:p>
+          <a:p>
+            <a:pPr lvl="1"/>
+            <a:r>
+              <a:rPr lang="en-US" dirty="0" smtClean="0"/>
+              <a:t>Avoid using the “Save As” dialogue box</a:t>
+            </a:r>
+          </a:p>
+          <a:p>
+            <a:r>
+              <a:rPr lang="en-US" dirty="0" smtClean="0">
+                <a:solidFill>
+                  <a:srgbClr val="000000"/>
                 </a:solidFill>
                 <a:latin typeface="Calibri"/>
               </a:rPr>
-              <a:t>DEMO</a:t>
-            </a:r>
+              <a:t>Example: </a:t>
+            </a:r>
+            <a:r>
+              <a:rPr lang="en-US" dirty="0">
+                <a:solidFill>
+                  <a:srgbClr val="000000"/>
+                </a:solidFill>
+              </a:rPr>
+              <a:t>curl </a:t>
+            </a:r>
+            <a:r>
+              <a:rPr lang="en-US" dirty="0" smtClean="0">
+                <a:solidFill>
+                  <a:srgbClr val="000000"/>
+                </a:solidFill>
+              </a:rPr>
+              <a:t>http</a:t>
+            </a:r>
+            <a:r>
+              <a:rPr lang="en-US" dirty="0">
+                <a:solidFill>
+                  <a:srgbClr val="000000"/>
+                </a:solidFill>
+              </a:rPr>
+              <a:t>://</a:t>
+            </a:r>
+            <a:r>
+              <a:rPr lang="en-US" dirty="0" err="1">
+                <a:solidFill>
+                  <a:srgbClr val="000000"/>
+                </a:solidFill>
+              </a:rPr>
+              <a:t>wttr.in</a:t>
+            </a:r>
+            <a:r>
+              <a:rPr lang="en-US" dirty="0">
+                <a:solidFill>
+                  <a:srgbClr val="000000"/>
+                </a:solidFill>
+              </a:rPr>
+              <a:t>/~Eugene</a:t>
+            </a:r>
+            <a:endParaRPr lang="en-US" dirty="0" smtClean="0">
+              <a:solidFill>
+                <a:srgbClr val="000000"/>
+              </a:solidFill>
+              <a:latin typeface="Calibri"/>
+            </a:endParaRPr>
           </a:p>
           <a:p>
             <a:pPr lvl="1"/>
-            <a:endParaRPr lang="en-US" sz="2400">
+            <a:r>
+              <a:rPr lang="en-US" dirty="0" smtClean="0">
+                <a:solidFill>
+                  <a:srgbClr val="000000"/>
+                </a:solidFill>
+                <a:latin typeface="Calibri"/>
+              </a:rPr>
+              <a:t>What’s it do? Try it out right now!</a:t>
+            </a:r>
+            <a:endParaRPr lang="en-US" sz="2400" dirty="0"/>
+          </a:p>
+          <a:p>
+            <a:endParaRPr lang="en-US" dirty="0">
+              <a:solidFill>
+                <a:srgbClr val="000000"/>
+              </a:solidFill>
               <a:latin typeface="Calibri"/>
             </a:endParaRPr>
           </a:p>
@@ -6908,13 +7447,20 @@
     </p:spTree>
     <p:extLst>
       <p:ext uri="{BB962C8B-B14F-4D97-AF65-F5344CB8AC3E}">
-        <p14:creationId xmlns:p14="http://schemas.microsoft.com/office/powerpoint/2010/main" val="2110228498"/>
+        <p14:creationId xmlns:p14="http://schemas.microsoft.com/office/powerpoint/2010/main" val="1799246308"/>
       </p:ext>
     </p:extLst>
   </p:cSld>
   <p:clrMapOvr>
     <a:masterClrMapping/>
   </p:clrMapOvr>
+  <p:timing>
+    <p:tnLst>
+      <p:par>
+        <p:cTn id="1" dur="indefinite" restart="never" nodeType="tmRoot"/>
+      </p:par>
+    </p:tnLst>
+  </p:timing>
 </p:sld>
 </file>
 
@@ -7136,7 +7682,7 @@
   <p:timing>
     <p:tnLst>
       <p:par>
-        <p:cTn xmlns:p14="http://schemas.microsoft.com/office/powerpoint/2010/main" id="1" dur="indefinite" restart="never" nodeType="tmRoot">
+        <p:cTn id="1" dur="indefinite" restart="never" nodeType="tmRoot">
           <p:childTnLst>
             <p:seq concurrent="1" nextAc="seek">
               <p:cTn id="2" dur="indefinite" nodeType="mainSeq">
@@ -7598,181 +8144,28 @@
           <a:p>
             <a:r>
               <a:rPr lang="en-US" dirty="0"/>
-              <a:t>let's download some of the CIS 330 lecture slides and tar just the PDFs</a:t>
+              <a:t>L</a:t>
+            </a:r>
+            <a:r>
+              <a:rPr lang="en-US" dirty="0" smtClean="0"/>
+              <a:t>et's </a:t>
+            </a:r>
+            <a:r>
+              <a:rPr lang="en-US" dirty="0"/>
+              <a:t>download some of the CIS 330 lecture slides and tar just the PDFs</a:t>
             </a:r>
           </a:p>
           <a:p>
             <a:pPr lvl="1"/>
             <a:r>
-              <a:rPr lang="en-US" sz="2400" dirty="0"/>
-              <a:t>URL</a:t>
-            </a:r>
-            <a:r>
-              <a:rPr lang="en-US" sz="2400" dirty="0"/>
-              <a:t>=http://</a:t>
-            </a:r>
-            <a:r>
-              <a:rPr lang="en-US" sz="2400" dirty="0" err="1"/>
-              <a:t>ix.cs.uoregon.edu</a:t>
-            </a:r>
-            <a:r>
-              <a:rPr lang="en-US" sz="2400" dirty="0"/>
-              <a:t>/~hank/330/</a:t>
-            </a:r>
-            <a:r>
-              <a:rPr lang="en-US" sz="2400" dirty="0" smtClean="0"/>
-              <a:t>lectures</a:t>
-            </a:r>
-          </a:p>
-          <a:p>
-            <a:pPr lvl="1"/>
-            <a:r>
-              <a:rPr lang="en-US" sz="2400" dirty="0" smtClean="0">
-                <a:solidFill>
-                  <a:srgbClr val="000000"/>
+              <a:rPr lang="en-US" dirty="0">
+                <a:solidFill>
+                  <a:srgbClr val="7F7F7F"/>
                 </a:solidFill>
                 <a:latin typeface="Calibri"/>
               </a:rPr>
-              <a:t>curl </a:t>
-            </a:r>
-            <a:r>
-              <a:rPr lang="en-US" sz="2400" dirty="0">
-                <a:solidFill>
-                  <a:srgbClr val="000000"/>
-                </a:solidFill>
-                <a:latin typeface="Calibri"/>
-              </a:rPr>
-              <a:t>-O $URL/</a:t>
-            </a:r>
-            <a:r>
-              <a:rPr lang="en-US" sz="2400" dirty="0" smtClean="0">
-                <a:solidFill>
-                  <a:srgbClr val="000000"/>
-                </a:solidFill>
-                <a:latin typeface="Calibri"/>
-              </a:rPr>
-              <a:t>CIS330_S18_Lec1</a:t>
-            </a:r>
-            <a:r>
-              <a:rPr lang="en-US" sz="2400" dirty="0">
-                <a:solidFill>
-                  <a:srgbClr val="000000"/>
-                </a:solidFill>
-                <a:latin typeface="Calibri"/>
-              </a:rPr>
-              <a:t>.pdf</a:t>
-            </a:r>
-          </a:p>
-          <a:p>
-            <a:pPr lvl="1"/>
-            <a:r>
-              <a:rPr lang="en-US" sz="2400" dirty="0">
-                <a:latin typeface="Calibri"/>
-              </a:rPr>
-              <a:t>curl -O $URL/</a:t>
-            </a:r>
-            <a:r>
-              <a:rPr lang="en-US" sz="2400" dirty="0" smtClean="0">
-                <a:latin typeface="Calibri"/>
-              </a:rPr>
-              <a:t>CIS330_S18_Lec1</a:t>
-            </a:r>
-            <a:r>
-              <a:rPr lang="en-US" sz="2400" dirty="0">
-                <a:latin typeface="Calibri"/>
-              </a:rPr>
-              <a:t>.pptx</a:t>
-            </a:r>
-          </a:p>
-          <a:p>
-            <a:pPr lvl="1"/>
-            <a:r>
-              <a:rPr lang="en-US" sz="2400" dirty="0">
-                <a:latin typeface="Calibri"/>
-              </a:rPr>
-              <a:t>curl -O $URL/</a:t>
-            </a:r>
-            <a:r>
-              <a:rPr lang="en-US" sz="2400" dirty="0" smtClean="0">
-                <a:latin typeface="Calibri"/>
-              </a:rPr>
-              <a:t>CIS330_S18_Lec2</a:t>
-            </a:r>
-            <a:r>
-              <a:rPr lang="en-US" sz="2400" dirty="0">
-                <a:latin typeface="Calibri"/>
-              </a:rPr>
-              <a:t>.pdf</a:t>
-            </a:r>
-          </a:p>
-          <a:p>
-            <a:pPr lvl="1"/>
-            <a:r>
-              <a:rPr lang="en-US" sz="2400" dirty="0">
-                <a:latin typeface="Calibri"/>
-              </a:rPr>
-              <a:t>curl -O $URL/</a:t>
-            </a:r>
-            <a:r>
-              <a:rPr lang="en-US" sz="2400" dirty="0" smtClean="0">
-                <a:latin typeface="Calibri"/>
-              </a:rPr>
-              <a:t>CIS330_S18_Lec2</a:t>
-            </a:r>
-            <a:r>
-              <a:rPr lang="en-US" sz="2400" dirty="0">
-                <a:latin typeface="Calibri"/>
-              </a:rPr>
-              <a:t>.pptx</a:t>
-            </a:r>
-          </a:p>
-          <a:p>
-            <a:pPr lvl="1"/>
-            <a:r>
-              <a:rPr lang="en-US" sz="2400" dirty="0">
-                <a:latin typeface="Calibri"/>
-              </a:rPr>
-              <a:t>tar </a:t>
-            </a:r>
-            <a:r>
-              <a:rPr lang="en-US" sz="2400" dirty="0" smtClean="0">
-                <a:latin typeface="Calibri"/>
-              </a:rPr>
-              <a:t>-</a:t>
-            </a:r>
-            <a:r>
-              <a:rPr lang="en-US" sz="2400" dirty="0" err="1" smtClean="0">
-                <a:latin typeface="Calibri"/>
-              </a:rPr>
-              <a:t>cvf</a:t>
-            </a:r>
-            <a:r>
-              <a:rPr lang="en-US" sz="2400" dirty="0" smtClean="0">
-                <a:latin typeface="Calibri"/>
-              </a:rPr>
-              <a:t> </a:t>
-            </a:r>
-            <a:r>
-              <a:rPr lang="en-US" sz="2400" dirty="0" err="1">
-                <a:latin typeface="Calibri"/>
-              </a:rPr>
-              <a:t>lecture_notes.tar</a:t>
-            </a:r>
-            <a:r>
-              <a:rPr lang="en-US" sz="2400" dirty="0">
-                <a:latin typeface="Calibri"/>
-              </a:rPr>
-              <a:t> *.</a:t>
-            </a:r>
-            <a:r>
-              <a:rPr lang="en-US" sz="2400" dirty="0" err="1">
-                <a:latin typeface="Calibri"/>
-              </a:rPr>
-              <a:t>pdf</a:t>
-            </a:r>
-            <a:endParaRPr lang="en-US" sz="2400" dirty="0">
-              <a:latin typeface="Calibri"/>
-            </a:endParaRPr>
+              <a:t>DEMO</a:t>
+            </a:r>
           </a:p>
           <a:p>
             <a:pPr lvl="1"/>
@@ -7785,13 +8178,20 @@
     </p:spTree>
     <p:extLst>
       <p:ext uri="{BB962C8B-B14F-4D97-AF65-F5344CB8AC3E}">
-        <p14:creationId xmlns:p14="http://schemas.microsoft.com/office/powerpoint/2010/main" val="4035366323"/>
+        <p14:creationId xmlns:p14="http://schemas.microsoft.com/office/powerpoint/2010/main" val="2110228498"/>
       </p:ext>
     </p:extLst>
   </p:cSld>
   <p:clrMapOvr>
     <a:masterClrMapping/>
   </p:clrMapOvr>
+  <p:timing>
+    <p:tnLst>
+      <p:par>
+        <p:cTn id="1" dur="indefinite" restart="never" nodeType="tmRoot"/>
+      </p:par>
+    </p:tnLst>
+  </p:timing>
 </p:sld>
 </file>
 
@@ -7842,234 +8242,227 @@
                 </a:solidFill>
                 <a:latin typeface="Calibri"/>
               </a:rPr>
-              <a:t>Unix command: alias</a:t>
-            </a:r>
-          </a:p>
-        </p:txBody>
-      </p:sp>
-      <p:sp>
-        <p:nvSpPr>
-          <p:cNvPr id="3" name="TextBox 2"/>
-          <p:cNvSpPr txBox="1"/>
-          <p:nvPr/>
-        </p:nvSpPr>
-        <p:spPr>
-          <a:xfrm>
-            <a:off x="304800" y="1543050"/>
-            <a:ext cx="8691133" cy="2677656"/>
-          </a:xfrm>
-          <a:prstGeom prst="rect">
-            <a:avLst/>
-          </a:prstGeom>
-        </p:spPr>
-        <p:txBody>
-          <a:bodyPr rtlCol="0">
-            <a:spAutoFit/>
+              <a:t>Example: curl</a:t>
+            </a:r>
+          </a:p>
+        </p:txBody>
+      </p:sp>
+      <p:sp>
+        <p:nvSpPr>
+          <p:cNvPr id="3" name="Content Placeholder 2"/>
+          <p:cNvSpPr>
+            <a:spLocks noGrp="1"/>
+          </p:cNvSpPr>
+          <p:nvPr>
+            <p:ph idx="1"/>
+          </p:nvPr>
+        </p:nvSpPr>
+        <p:spPr/>
+        <p:txBody>
+          <a:bodyPr vert="horz" lIns="91440" tIns="45720" rIns="91440" bIns="45720" rtlCol="0" anchor="t">
+            <a:normAutofit/>
           </a:bodyPr>
           <a:lstStyle/>
           <a:p>
-            <a:pPr marL="285750" indent="-285750">
-              <a:buFont typeface="Arial" panose="020B0604020202020204" pitchFamily="34" charset="0"/>
-              <a:buChar char="•"/>
-            </a:pPr>
-            <a:r>
-              <a:rPr lang="en-US" sz="2800" dirty="0"/>
-              <a:t>alias: avoid typing a long command sequence repeatedly</a:t>
-            </a:r>
-          </a:p>
-          <a:p>
-            <a:pPr marL="285750" indent="-285750">
-              <a:buFont typeface="Arial" panose="020B0604020202020204" pitchFamily="34" charset="0"/>
-              <a:buChar char="•"/>
-            </a:pPr>
-            <a:endParaRPr lang="en-US" sz="2800" dirty="0"/>
-          </a:p>
-          <a:p>
-            <a:pPr marL="457200" indent="-457200">
-              <a:buFont typeface="Arial" panose="020B0604020202020204" pitchFamily="34" charset="0"/>
-              <a:buChar char="•"/>
-            </a:pPr>
-            <a:r>
-              <a:rPr lang="en-US" sz="2800" dirty="0"/>
-              <a:t>Example: clean, compile, run</a:t>
+            <a:r>
+              <a:rPr lang="en-US" dirty="0"/>
+              <a:t>let's download some of the CIS 330 lecture slides and tar just the PDFs</a:t>
             </a:r>
           </a:p>
           <a:p>
             <a:pPr lvl="1"/>
             <a:r>
-              <a:rPr lang="en-US" sz="2800" dirty="0"/>
-              <a:t>    </a:t>
-            </a:r>
-            <a:r>
-              <a:rPr lang="en-US" sz="2800" dirty="0">
-                <a:solidFill>
-                  <a:srgbClr val="7F7F7F"/>
-                </a:solidFill>
-              </a:rPr>
-              <a:t>alias go='make clean; make; ./</a:t>
-            </a:r>
-            <a:r>
-              <a:rPr lang="en-US" sz="2800" dirty="0" err="1">
-                <a:solidFill>
-                  <a:srgbClr val="7F7F7F"/>
-                </a:solidFill>
-              </a:rPr>
-              <a:t>my_program</a:t>
-            </a:r>
-            <a:r>
-              <a:rPr lang="en-US" sz="2800" dirty="0">
-                <a:solidFill>
-                  <a:srgbClr val="7F7F7F"/>
-                </a:solidFill>
-              </a:rPr>
-              <a:t>'</a:t>
-            </a:r>
-          </a:p>
-          <a:p>
-            <a:pPr marL="457200" indent="-457200">
-              <a:buFont typeface="Arial" panose="020B0604020202020204" pitchFamily="34" charset="0"/>
-              <a:buChar char="•"/>
-            </a:pPr>
-            <a:r>
-              <a:rPr lang="en-US" sz="2800" dirty="0"/>
-              <a:t>Example: </a:t>
-            </a:r>
-            <a:r>
-              <a:rPr lang="en-US" sz="2800" dirty="0" err="1"/>
-              <a:t>ssh</a:t>
-            </a:r>
-            <a:r>
-              <a:rPr lang="en-US" sz="2800" dirty="0"/>
-              <a:t> to </a:t>
-            </a:r>
-            <a:r>
-              <a:rPr lang="en-US" sz="2800" dirty="0" smtClean="0"/>
-              <a:t>ix-</a:t>
-            </a:r>
-            <a:r>
-              <a:rPr lang="en-US" sz="2800" dirty="0" err="1" smtClean="0"/>
-              <a:t>dev</a:t>
-            </a:r>
-            <a:r>
-              <a:rPr lang="en-US" sz="2800" dirty="0" smtClean="0"/>
+              <a:rPr lang="en-US" sz="2400" dirty="0"/>
+              <a:t>URL=http://</a:t>
+            </a:r>
+            <a:r>
+              <a:rPr lang="en-US" sz="2400" dirty="0" err="1"/>
+              <a:t>ix.cs.uoregon.edu</a:t>
+            </a:r>
+            <a:r>
+              <a:rPr lang="en-US" sz="2400" dirty="0"/>
+              <a:t>/~hank/330/</a:t>
+            </a:r>
+            <a:r>
+              <a:rPr lang="en-US" sz="2400" dirty="0" smtClean="0"/>
+              <a:t>lectures</a:t>
+            </a:r>
+          </a:p>
+          <a:p>
+            <a:pPr lvl="1"/>
+            <a:r>
+              <a:rPr lang="en-US" sz="2400" dirty="0" smtClean="0">
+                <a:solidFill>
+                  <a:srgbClr val="000000"/>
+                </a:solidFill>
+                <a:latin typeface="Calibri"/>
+              </a:rPr>
+              <a:t>curl </a:t>
+            </a:r>
+            <a:r>
+              <a:rPr lang="en-US" sz="2400" dirty="0">
+                <a:solidFill>
+                  <a:srgbClr val="000000"/>
+                </a:solidFill>
+                <a:latin typeface="Calibri"/>
+              </a:rPr>
+              <a:t>-O $URL/</a:t>
+            </a:r>
+            <a:r>
+              <a:rPr lang="en-US" sz="2400" dirty="0" smtClean="0">
+                <a:solidFill>
+                  <a:srgbClr val="000000"/>
+                </a:solidFill>
+                <a:latin typeface="Calibri"/>
+              </a:rPr>
+              <a:t>CIS330_S18_Lec1</a:t>
+            </a:r>
+            <a:r>
+              <a:rPr lang="en-US" sz="2400" dirty="0">
+                <a:solidFill>
+                  <a:srgbClr val="000000"/>
+                </a:solidFill>
+                <a:latin typeface="Calibri"/>
+              </a:rPr>
+              <a:t>.pdf</a:t>
+            </a:r>
+          </a:p>
+          <a:p>
+            <a:pPr lvl="1"/>
+            <a:r>
+              <a:rPr lang="en-US" sz="2400" dirty="0">
+                <a:latin typeface="Calibri"/>
+              </a:rPr>
+              <a:t>curl -O $URL/</a:t>
+            </a:r>
+            <a:r>
+              <a:rPr lang="en-US" sz="2400" dirty="0" smtClean="0">
+                <a:latin typeface="Calibri"/>
+              </a:rPr>
+              <a:t>CIS330_S18_Lec1</a:t>
+            </a:r>
+            <a:r>
+              <a:rPr lang="en-US" sz="2400" dirty="0">
+                <a:latin typeface="Calibri"/>
+              </a:rPr>
+              <a:t>.pptx</a:t>
+            </a:r>
+          </a:p>
+          <a:p>
+            <a:pPr lvl="1"/>
+            <a:r>
+              <a:rPr lang="en-US" sz="2400" dirty="0">
+                <a:latin typeface="Calibri"/>
+              </a:rPr>
+              <a:t>curl -O $URL/</a:t>
+            </a:r>
+            <a:r>
+              <a:rPr lang="en-US" sz="2400" dirty="0" smtClean="0">
+                <a:latin typeface="Calibri"/>
+              </a:rPr>
+              <a:t>CIS330_S18_Lec2</a:t>
+            </a:r>
+            <a:r>
+              <a:rPr lang="en-US" sz="2400" dirty="0">
+                <a:latin typeface="Calibri"/>
+              </a:rPr>
+              <a:t>.pdf</a:t>
+            </a:r>
+          </a:p>
+          <a:p>
+            <a:pPr lvl="1"/>
+            <a:r>
+              <a:rPr lang="en-US" sz="2400" dirty="0">
+                <a:latin typeface="Calibri"/>
+              </a:rPr>
+              <a:t>curl -O $URL/</a:t>
+            </a:r>
+            <a:r>
+              <a:rPr lang="en-US" sz="2400" dirty="0" smtClean="0">
+                <a:latin typeface="Calibri"/>
+              </a:rPr>
+              <a:t>CIS330_S18_Lec2</a:t>
+            </a:r>
+            <a:r>
+              <a:rPr lang="en-US" sz="2400" dirty="0">
+                <a:latin typeface="Calibri"/>
+              </a:rPr>
+              <a:t>.pptx</a:t>
+            </a:r>
+          </a:p>
+          <a:p>
+            <a:pPr lvl="1"/>
+            <a:r>
+              <a:rPr lang="en-US" sz="2400" dirty="0">
+                <a:latin typeface="Calibri"/>
+              </a:rPr>
+              <a:t>tar </a:t>
+            </a:r>
+            <a:r>
+              <a:rPr lang="en-US" sz="2400" dirty="0" smtClean="0">
+                <a:latin typeface="Calibri"/>
+              </a:rPr>
+              <a:t>-</a:t>
+            </a:r>
+            <a:r>
+              <a:rPr lang="en-US" sz="2400" dirty="0" err="1" smtClean="0">
+                <a:latin typeface="Calibri"/>
+              </a:rPr>
+              <a:t>cvf</a:t>
+            </a:r>
+            <a:r>
+              <a:rPr lang="en-US" sz="2400" dirty="0" smtClean="0">
+                <a:latin typeface="Calibri"/>
+              </a:rPr>
               <a:t> </a:t>
             </a:r>
             <a:r>
-              <a:rPr lang="en-US" sz="2800" dirty="0"/>
-              <a:t>a lot</a:t>
-            </a:r>
+              <a:rPr lang="en-US" sz="2400" dirty="0" err="1">
+                <a:latin typeface="Calibri"/>
+              </a:rPr>
+              <a:t>lecture_notes.tar</a:t>
+            </a:r>
+            <a:r>
+              <a:rPr lang="en-US" sz="2400" dirty="0">
+                <a:latin typeface="Calibri"/>
+              </a:rPr>
+              <a:t> *.</a:t>
+            </a:r>
+            <a:r>
+              <a:rPr lang="en-US" sz="2400" dirty="0" err="1">
+                <a:latin typeface="Calibri"/>
+              </a:rPr>
+              <a:t>pdf</a:t>
+            </a:r>
+            <a:endParaRPr lang="en-US" sz="2400" dirty="0">
+              <a:latin typeface="Calibri"/>
+            </a:endParaRPr>
           </a:p>
           <a:p>
             <a:pPr lvl="1"/>
-            <a:r>
-              <a:rPr lang="en-US" sz="2800" dirty="0"/>
-              <a:t>    </a:t>
-            </a:r>
-            <a:r>
-              <a:rPr lang="en-US" sz="2800" dirty="0">
-                <a:solidFill>
-                  <a:srgbClr val="7F7F7F"/>
-                </a:solidFill>
-              </a:rPr>
-              <a:t>alias ix='</a:t>
-            </a:r>
-            <a:r>
-              <a:rPr lang="en-US" sz="2800" dirty="0" err="1">
-                <a:solidFill>
-                  <a:srgbClr val="7F7F7F"/>
-                </a:solidFill>
-              </a:rPr>
-              <a:t>ssh</a:t>
-            </a:r>
-            <a:r>
-              <a:rPr lang="en-US" sz="2800" dirty="0">
-                <a:solidFill>
-                  <a:srgbClr val="7F7F7F"/>
-                </a:solidFill>
-              </a:rPr>
-              <a:t> </a:t>
-            </a:r>
-            <a:r>
-              <a:rPr lang="en-US" sz="2800" dirty="0" err="1">
-                <a:solidFill>
-                  <a:srgbClr val="7F7F7F"/>
-                </a:solidFill>
-              </a:rPr>
-              <a:t>username@</a:t>
-            </a:r>
-            <a:r>
-              <a:rPr lang="en-US" sz="2800" dirty="0" err="1" smtClean="0">
-                <a:solidFill>
-                  <a:srgbClr val="7F7F7F"/>
-                </a:solidFill>
-              </a:rPr>
-              <a:t>ix-dev.cs.uoregon.edu</a:t>
-            </a:r>
-            <a:r>
-              <a:rPr lang="en-US" sz="2800" dirty="0">
-                <a:solidFill>
-                  <a:srgbClr val="7F7F7F"/>
-                </a:solidFill>
-              </a:rPr>
-              <a:t>'</a:t>
-            </a:r>
-          </a:p>
-        </p:txBody>
-      </p:sp>
-      <p:sp>
-        <p:nvSpPr>
-          <p:cNvPr id="4" name="TextBox 3"/>
-          <p:cNvSpPr txBox="1"/>
-          <p:nvPr/>
-        </p:nvSpPr>
-        <p:spPr>
-          <a:xfrm>
-            <a:off x="180975" y="4429125"/>
-            <a:ext cx="8452039" cy="830997"/>
-          </a:xfrm>
-          <a:prstGeom prst="rect">
-            <a:avLst/>
-          </a:prstGeom>
-        </p:spPr>
-        <p:txBody>
-          <a:bodyPr rtlCol="0">
-            <a:spAutoFit/>
-          </a:bodyPr>
-          <a:lstStyle/>
-          <a:p>
-            <a:r>
-              <a:rPr lang="en-US" sz="2400"/>
-              <a:t>Put an alias command (or anything else) in your ~/.</a:t>
-            </a:r>
-            <a:r>
-              <a:rPr lang="en-US" sz="2400" err="1"/>
-              <a:t>bashrc</a:t>
-            </a:r>
-            <a:r>
-              <a:rPr lang="en-US" sz="2400"/>
-              <a:t> file to make it persistent!  </a:t>
-            </a:r>
-            <a:r>
-              <a:rPr lang="en-US" sz="2400">
-                <a:solidFill>
-                  <a:srgbClr val="7F7F7F"/>
-                </a:solidFill>
-              </a:rPr>
-              <a:t>DEMO</a:t>
-            </a:r>
+            <a:endParaRPr lang="en-US" sz="2400" dirty="0">
+              <a:latin typeface="Calibri"/>
+            </a:endParaRPr>
           </a:p>
         </p:txBody>
       </p:sp>
     </p:spTree>
     <p:extLst>
       <p:ext uri="{BB962C8B-B14F-4D97-AF65-F5344CB8AC3E}">
-        <p14:creationId xmlns:p14="http://schemas.microsoft.com/office/powerpoint/2010/main" val="353183349"/>
+        <p14:creationId xmlns:p14="http://schemas.microsoft.com/office/powerpoint/2010/main" val="4035366323"/>
       </p:ext>
     </p:extLst>
   </p:cSld>
   <p:clrMapOvr>
     <a:masterClrMapping/>
   </p:clrMapOvr>
+  <p:timing>
+    <p:tnLst>
+      <p:par>
+        <p:cTn id="1" dur="indefinite" restart="never" nodeType="tmRoot"/>
+      </p:par>
+    </p:tnLst>
+  </p:timing>
 </p:sld>
 </file>
 
@@ -8107,6 +8500,267 @@
           <a:p>
             <a:r>
               <a:rPr lang="en-US"/>
+              <a:t>Wildcards</a:t>
+            </a:r>
+          </a:p>
+        </p:txBody>
+      </p:sp>
+      <p:sp>
+        <p:nvSpPr>
+          <p:cNvPr id="3" name="Content Placeholder 2"/>
+          <p:cNvSpPr>
+            <a:spLocks noGrp="1"/>
+          </p:cNvSpPr>
+          <p:nvPr>
+            <p:ph idx="1"/>
+          </p:nvPr>
+        </p:nvSpPr>
+        <p:spPr/>
+        <p:txBody>
+          <a:bodyPr/>
+          <a:lstStyle/>
+          <a:p>
+            <a:r>
+              <a:rPr lang="en-US"/>
+              <a:t>‘*’ is a wildcard with </a:t>
+            </a:r>
+            <a:r>
+              <a:rPr lang="en-US" err="1"/>
+              <a:t>unix</a:t>
+            </a:r>
+            <a:r>
+              <a:rPr lang="en-US"/>
+              <a:t> shells</a:t>
+            </a:r>
+          </a:p>
+          <a:p>
+            <a:endParaRPr lang="en-US"/>
+          </a:p>
+        </p:txBody>
+      </p:sp>
+      <p:pic>
+        <p:nvPicPr>
+          <p:cNvPr id="5" name="Picture 4" descr="Screen shot 2016-04-14 at 8.04.29 PM.png"/>
+          <p:cNvPicPr>
+            <a:picLocks noChangeAspect="1"/>
+          </p:cNvPicPr>
+          <p:nvPr/>
+        </p:nvPicPr>
+        <p:blipFill>
+          <a:blip r:embed="rId2">
+            <a:extLst>
+              <a:ext uri="{28A0092B-C50C-407E-A947-70E740481C1C}">
+                <a14:useLocalDpi xmlns:a14="http://schemas.microsoft.com/office/drawing/2010/main" val="0"/>
+              </a:ext>
+            </a:extLst>
+          </a:blip>
+          <a:stretch>
+            <a:fillRect/>
+          </a:stretch>
+        </p:blipFill>
+        <p:spPr>
+          <a:xfrm>
+            <a:off x="793711" y="2306622"/>
+            <a:ext cx="6215226" cy="3709903"/>
+          </a:xfrm>
+          <a:prstGeom prst="rect">
+            <a:avLst/>
+          </a:prstGeom>
+        </p:spPr>
+      </p:pic>
+      <p:sp>
+        <p:nvSpPr>
+          <p:cNvPr id="6" name="Rounded Rectangle 5"/>
+          <p:cNvSpPr/>
+          <p:nvPr/>
+        </p:nvSpPr>
+        <p:spPr>
+          <a:xfrm>
+            <a:off x="978509" y="6214476"/>
+            <a:ext cx="7168445" cy="643524"/>
+          </a:xfrm>
+          <a:prstGeom prst="roundRect">
+            <a:avLst/>
+          </a:prstGeom>
+          <a:gradFill>
+            <a:gsLst>
+              <a:gs pos="0">
+                <a:srgbClr val="FFFF3E"/>
+              </a:gs>
+              <a:gs pos="100000">
+                <a:srgbClr val="FFFFCA"/>
+              </a:gs>
+            </a:gsLst>
+          </a:gradFill>
+          <a:ln w="76200" cmpd="tri">
+            <a:solidFill>
+              <a:schemeClr val="tx1"/>
+            </a:solidFill>
+          </a:ln>
+        </p:spPr>
+        <p:style>
+          <a:lnRef idx="1">
+            <a:schemeClr val="accent1"/>
+          </a:lnRef>
+          <a:fillRef idx="3">
+            <a:schemeClr val="accent1"/>
+          </a:fillRef>
+          <a:effectRef idx="2">
+            <a:schemeClr val="accent1"/>
+          </a:effectRef>
+          <a:fontRef idx="minor">
+            <a:schemeClr val="lt1"/>
+          </a:fontRef>
+        </p:style>
+        <p:txBody>
+          <a:bodyPr rtlCol="0" anchor="ctr"/>
+          <a:lstStyle/>
+          <a:p>
+            <a:pPr algn="ctr"/>
+            <a:r>
+              <a:rPr lang="en-US" sz="2400">
+                <a:solidFill>
+                  <a:schemeClr val="tx1"/>
+                </a:solidFill>
+              </a:rPr>
+              <a:t>‘?’ is a wildcard that matches exactly one character</a:t>
+            </a:r>
+          </a:p>
+        </p:txBody>
+      </p:sp>
+    </p:spTree>
+    <p:extLst>
+      <p:ext uri="{BB962C8B-B14F-4D97-AF65-F5344CB8AC3E}">
+        <p14:creationId xmlns:p14="http://schemas.microsoft.com/office/powerpoint/2010/main" val="2489502866"/>
+      </p:ext>
+    </p:extLst>
+  </p:cSld>
+  <p:clrMapOvr>
+    <a:masterClrMapping/>
+  </p:clrMapOvr>
+  <p:timing>
+    <p:tnLst>
+      <p:par>
+        <p:cTn id="1" dur="indefinite" restart="never" nodeType="tmRoot">
+          <p:childTnLst>
+            <p:seq concurrent="1" nextAc="seek">
+              <p:cTn id="2" dur="indefinite" nodeType="mainSeq">
+                <p:childTnLst>
+                  <p:par>
+                    <p:cTn id="3" fill="hold">
+                      <p:stCondLst>
+                        <p:cond delay="indefinite"/>
+                      </p:stCondLst>
+                      <p:childTnLst>
+                        <p:par>
+                          <p:cTn id="4" fill="hold">
+                            <p:stCondLst>
+                              <p:cond delay="0"/>
+                            </p:stCondLst>
+                            <p:childTnLst>
+                              <p:par>
+                                <p:cTn id="5" presetID="22" presetClass="entr" presetSubtype="1" fill="hold" grpId="0" nodeType="clickEffect">
+                                  <p:stCondLst>
+                                    <p:cond delay="0"/>
+                                  </p:stCondLst>
+                                  <p:childTnLst>
+                                    <p:set>
+                                      <p:cBhvr>
+                                        <p:cTn id="6" dur="1" fill="hold">
+                                          <p:stCondLst>
+                                            <p:cond delay="0"/>
+                                          </p:stCondLst>
+                                        </p:cTn>
+                                        <p:tgtEl>
+                                          <p:spTgt spid="6"/>
+                                        </p:tgtEl>
+                                        <p:attrNameLst>
+                                          <p:attrName>style.visibility</p:attrName>
+                                        </p:attrNameLst>
+                                      </p:cBhvr>
+                                      <p:to>
+                                        <p:strVal val="visible"/>
+                                      </p:to>
+                                    </p:set>
+                                    <p:animEffect transition="in" filter="wipe(up)">
+                                      <p:cBhvr>
+                                        <p:cTn id="7" dur="500"/>
+                                        <p:tgtEl>
+                                          <p:spTgt spid="6"/>
+                                        </p:tgtEl>
+                                      </p:cBhvr>
+                                    </p:animEffect>
+                                  </p:childTnLst>
+                                </p:cTn>
+                              </p:par>
+                            </p:childTnLst>
+                          </p:cTn>
+                        </p:par>
+                      </p:childTnLst>
+                    </p:cTn>
+                  </p:par>
+                </p:childTnLst>
+              </p:cTn>
+              <p:prevCondLst>
+                <p:cond evt="onPrev" delay="0">
+                  <p:tgtEl>
+                    <p:sldTgt/>
+                  </p:tgtEl>
+                </p:cond>
+              </p:prevCondLst>
+              <p:nextCondLst>
+                <p:cond evt="onNext" delay="0">
+                  <p:tgtEl>
+                    <p:sldTgt/>
+                  </p:tgtEl>
+                </p:cond>
+              </p:nextCondLst>
+            </p:seq>
+          </p:childTnLst>
+        </p:cTn>
+      </p:par>
+    </p:tnLst>
+    <p:bldLst>
+      <p:bldP spid="6" grpId="0" animBg="1"/>
+    </p:bldLst>
+  </p:timing>
+</p:sld>
+</file>
+
+<file path=ppt/slides/slide23.xml><?xml version="1.0" encoding="utf-8"?>
+<p:sld xmlns:a="http://schemas.openxmlformats.org/drawingml/2006/main" xmlns:r="http://schemas.openxmlformats.org/officeDocument/2006/relationships" xmlns:p="http://schemas.openxmlformats.org/presentationml/2006/main">
+  <p:cSld>
+    <p:spTree>
+      <p:nvGrpSpPr>
+        <p:cNvPr id="1" name=""/>
+        <p:cNvGrpSpPr/>
+        <p:nvPr/>
+      </p:nvGrpSpPr>
+      <p:grpSpPr>
+        <a:xfrm>
+          <a:off x="0" y="0"/>
+          <a:ext cx="0" cy="0"/>
+          <a:chOff x="0" y="0"/>
+          <a:chExt cx="0" cy="0"/>
+        </a:xfrm>
+      </p:grpSpPr>
+      <p:sp>
+        <p:nvSpPr>
+          <p:cNvPr id="2" name="Title 1"/>
+          <p:cNvSpPr>
+            <a:spLocks noGrp="1"/>
+          </p:cNvSpPr>
+          <p:nvPr>
+            <p:ph type="title"/>
+          </p:nvPr>
+        </p:nvSpPr>
+        <p:spPr/>
+        <p:txBody>
+          <a:bodyPr/>
+          <a:lstStyle/>
+          <a:p>
+            <a:r>
+              <a:rPr lang="en-US"/>
               <a:t>Other useful shell things</a:t>
             </a:r>
           </a:p>
@@ -8125,7 +8779,7 @@
         <p:spPr/>
         <p:txBody>
           <a:bodyPr vert="horz" lIns="91440" tIns="45720" rIns="91440" bIns="45720" rtlCol="0" anchor="t">
-            <a:normAutofit/>
+            <a:normAutofit lnSpcReduction="10000"/>
           </a:bodyPr>
           <a:lstStyle/>
           <a:p>
@@ -8171,6 +8825,20 @@
             <a:r>
               <a:rPr lang="en-US" dirty="0" smtClean="0"/>
               <a:t>command</a:t>
+            </a:r>
+          </a:p>
+          <a:p>
+            <a:r>
+              <a:rPr lang="en-US" dirty="0" smtClean="0"/>
+              <a:t>Unix tools: clear (clear off terminal screen), top/</a:t>
+            </a:r>
+            <a:r>
+              <a:rPr lang="en-US" dirty="0" err="1" smtClean="0"/>
+              <a:t>htop</a:t>
+            </a:r>
+            <a:r>
+              <a:rPr lang="en-US" dirty="0" smtClean="0"/>
+              <a:t> (monitor CPU resources and processes), ”mv” (rename a folder/file)</a:t>
             </a:r>
             <a:endParaRPr lang="en-US" dirty="0"/>
           </a:p>
@@ -8186,6 +8854,13 @@
   <p:clrMapOvr>
     <a:masterClrMapping/>
   </p:clrMapOvr>
+  <p:timing>
+    <p:tnLst>
+      <p:par>
+        <p:cTn id="1" dur="indefinite" restart="never" nodeType="tmRoot"/>
+      </p:par>
+    </p:tnLst>
+  </p:timing>
 </p:sld>
 </file>
 
@@ -8299,6 +8974,13 @@
   <p:clrMapOvr>
     <a:masterClrMapping/>
   </p:clrMapOvr>
+  <p:timing>
+    <p:tnLst>
+      <p:par>
+        <p:cTn id="1" dur="indefinite" restart="never" nodeType="tmRoot"/>
+      </p:par>
+    </p:tnLst>
+  </p:timing>
 </p:sld>
 </file>
 
@@ -8358,95 +9040,95 @@
           <a:lstStyle/>
           <a:p>
             <a:r>
-              <a:rPr lang="en-US"/>
+              <a:rPr lang="en-US" dirty="0"/>
               <a:t>Just like </a:t>
             </a:r>
             <a:r>
-              <a:rPr lang="en-US" err="1"/>
+              <a:rPr lang="en-US" dirty="0" err="1"/>
               <a:t>printf</a:t>
             </a:r>
             <a:r>
-              <a:rPr lang="en-US"/>
+              <a:rPr lang="en-US" dirty="0"/>
               <a:t>, but to streams</a:t>
             </a:r>
           </a:p>
           <a:p>
             <a:r>
-              <a:rPr lang="en-US" err="1"/>
+              <a:rPr lang="en-US" dirty="0" err="1"/>
               <a:t>fprintf</a:t>
             </a:r>
             <a:r>
-              <a:rPr lang="en-US"/>
+              <a:rPr lang="en-US" dirty="0"/>
               <a:t>(</a:t>
             </a:r>
             <a:r>
-              <a:rPr lang="en-US" err="1"/>
+              <a:rPr lang="en-US" dirty="0" err="1"/>
               <a:t>stdout</a:t>
             </a:r>
             <a:r>
-              <a:rPr lang="en-US"/>
+              <a:rPr lang="en-US" dirty="0"/>
               <a:t>, “</a:t>
             </a:r>
             <a:r>
-              <a:rPr lang="en-US" err="1"/>
+              <a:rPr lang="en-US" dirty="0" err="1"/>
               <a:t>helloworld</a:t>
             </a:r>
             <a:r>
-              <a:rPr lang="en-US"/>
+              <a:rPr lang="en-US" dirty="0"/>
               <a:t>\n”);</a:t>
             </a:r>
           </a:p>
           <a:p>
             <a:pPr lvl="1"/>
             <a:r>
-              <a:rPr lang="en-US">
+              <a:rPr lang="en-US" dirty="0">
                 <a:sym typeface="Wingdings"/>
               </a:rPr>
               <a:t> same as </a:t>
             </a:r>
             <a:r>
-              <a:rPr lang="en-US" err="1">
+              <a:rPr lang="en-US" dirty="0" err="1">
                 <a:sym typeface="Wingdings"/>
               </a:rPr>
               <a:t>printf</a:t>
             </a:r>
-            <a:endParaRPr lang="en-US">
+            <a:endParaRPr lang="en-US" dirty="0">
               <a:sym typeface="Wingdings"/>
             </a:endParaRPr>
           </a:p>
           <a:p>
             <a:r>
-              <a:rPr lang="en-US" err="1">
+              <a:rPr lang="en-US" dirty="0" err="1">
                 <a:sym typeface="Wingdings"/>
               </a:rPr>
               <a:t>fprintf</a:t>
             </a:r>
             <a:r>
-              <a:rPr lang="en-US">
+              <a:rPr lang="en-US" dirty="0">
                 <a:sym typeface="Wingdings"/>
               </a:rPr>
               <a:t>(</a:t>
             </a:r>
             <a:r>
-              <a:rPr lang="en-US" err="1">
+              <a:rPr lang="en-US" dirty="0" err="1">
                 <a:sym typeface="Wingdings"/>
               </a:rPr>
               <a:t>stderr</a:t>
             </a:r>
             <a:r>
-              <a:rPr lang="en-US">
+              <a:rPr lang="en-US" dirty="0">
                 <a:sym typeface="Wingdings"/>
               </a:rPr>
               <a:t>, “</a:t>
             </a:r>
             <a:r>
-              <a:rPr lang="en-US" err="1">
+              <a:rPr lang="en-US" dirty="0" err="1">
                 <a:sym typeface="Wingdings"/>
               </a:rPr>
               <a:t>helloworld</a:t>
             </a:r>
             <a:r>
-              <a:rPr lang="en-US">
+              <a:rPr lang="en-US" dirty="0">
                 <a:sym typeface="Wingdings"/>
               </a:rPr>
               <a:t>\n”);</a:t>
@@ -8455,7 +9137,7 @@
           <a:p>
             <a:pPr lvl="1"/>
             <a:r>
-              <a:rPr lang="en-US">
+              <a:rPr lang="en-US" dirty="0">
                 <a:sym typeface="Wingdings"/>
               </a:rPr>
               <a:t>prints to “standard error”</a:t>
@@ -8463,37 +9145,37 @@
           </a:p>
           <a:p>
             <a:r>
-              <a:rPr lang="en-US" err="1">
+              <a:rPr lang="en-US" dirty="0" err="1">
                 <a:sym typeface="Wingdings"/>
               </a:rPr>
               <a:t>fprintf</a:t>
             </a:r>
             <a:r>
-              <a:rPr lang="en-US">
+              <a:rPr lang="en-US" dirty="0">
                 <a:sym typeface="Wingdings"/>
               </a:rPr>
               <a:t>(</a:t>
             </a:r>
             <a:r>
-              <a:rPr lang="en-US" err="1">
+              <a:rPr lang="en-US" dirty="0" err="1">
                 <a:sym typeface="Wingdings"/>
               </a:rPr>
               <a:t>f_out</a:t>
             </a:r>
             <a:r>
-              <a:rPr lang="en-US">
+              <a:rPr lang="en-US" dirty="0">
                 <a:sym typeface="Wingdings"/>
               </a:rPr>
               <a:t>, “</a:t>
             </a:r>
             <a:r>
-              <a:rPr lang="en-US" err="1">
+              <a:rPr lang="en-US" dirty="0" err="1">
                 <a:sym typeface="Wingdings"/>
               </a:rPr>
               <a:t>helloworld</a:t>
             </a:r>
             <a:r>
-              <a:rPr lang="en-US">
+              <a:rPr lang="en-US" dirty="0">
                 <a:sym typeface="Wingdings"/>
               </a:rPr>
               <a:t>\n”);</a:t>
@@ -8502,24 +9184,24 @@
           <a:p>
             <a:pPr lvl="1"/>
             <a:r>
-              <a:rPr lang="en-US">
+              <a:rPr lang="en-US" dirty="0">
                 <a:sym typeface="Wingdings"/>
               </a:rPr>
               <a:t>prints to the file pointed to by FILE *</a:t>
             </a:r>
             <a:r>
-              <a:rPr lang="en-US" err="1">
+              <a:rPr lang="en-US" dirty="0" err="1">
                 <a:sym typeface="Wingdings"/>
               </a:rPr>
               <a:t>f_out</a:t>
             </a:r>
             <a:r>
-              <a:rPr lang="en-US">
+              <a:rPr lang="en-US" dirty="0">
                 <a:sym typeface="Wingdings"/>
               </a:rPr>
               <a:t>.</a:t>
             </a:r>
-            <a:endParaRPr lang="en-US"/>
+            <a:endParaRPr lang="en-US" dirty="0"/>
           </a:p>
         </p:txBody>
       </p:sp>
@@ -8533,6 +9215,13 @@
   <p:clrMapOvr>
     <a:masterClrMapping/>
   </p:clrMapOvr>
+  <p:timing>
+    <p:tnLst>
+      <p:par>
+        <p:cTn id="1" dur="indefinite" restart="never" nodeType="tmRoot"/>
+      </p:par>
+    </p:tnLst>
+  </p:timing>
 </p:sld>
 </file>
 
@@ -8643,7 +9332,7 @@
   <p:timing>
     <p:tnLst>
       <p:par>
-        <p:cTn xmlns:p14="http://schemas.microsoft.com/office/powerpoint/2010/main" id="1" dur="indefinite" restart="never" nodeType="tmRoot">
+        <p:cTn id="1" dur="indefinite" restart="never" nodeType="tmRoot">
           <p:childTnLst>
             <p:seq concurrent="1" nextAc="seek">
               <p:cTn id="2" dur="indefinite" nodeType="mainSeq">
@@ -9029,6 +9718,13 @@
   <p:clrMapOvr>
     <a:masterClrMapping/>
   </p:clrMapOvr>
+  <p:timing>
+    <p:tnLst>
+      <p:par>
+        <p:cTn id="1" dur="indefinite" restart="never" nodeType="tmRoot"/>
+      </p:par>
+    </p:tnLst>
+  </p:timing>
 </p:sld>
 </file>
 
@@ -9112,6 +9808,13 @@
   <p:clrMapOvr>
     <a:masterClrMapping/>
   </p:clrMapOvr>
+  <p:timing>
+    <p:tnLst>
+      <p:par>
+        <p:cTn id="1" dur="indefinite" restart="never" nodeType="tmRoot"/>
+      </p:par>
+    </p:tnLst>
+  </p:timing>
 </p:sld>
 </file>
 
@@ -9227,6 +9930,13 @@
   <p:clrMapOvr>
     <a:masterClrMapping/>
   </p:clrMapOvr>
+  <p:timing>
+    <p:tnLst>
+      <p:par>
+        <p:cTn id="1" dur="indefinite" restart="never" nodeType="tmRoot"/>
+      </p:par>
+    </p:tnLst>
+  </p:timing>
 </p:sld>
 </file>
 
@@ -9295,34 +10005,43 @@
           <a:lstStyle/>
           <a:p>
             <a:r>
-              <a:rPr lang="en-US"/>
-              <a:t>let's try to write the output of this program to files … stderr should go to a file called </a:t>
-            </a:r>
-            <a:r>
-              <a:rPr lang="en-US" err="1"/>
+              <a:rPr lang="en-US" dirty="0"/>
+              <a:t>let's try to write the output of this program to files … </a:t>
+            </a:r>
+            <a:r>
+              <a:rPr lang="en-US" dirty="0" err="1"/>
+              <a:t>stderr</a:t>
+            </a:r>
+            <a:r>
+              <a:rPr lang="en-US" dirty="0"/>
+              <a:t> should go to a file called </a:t>
+            </a:r>
+            <a:r>
+              <a:rPr lang="en-US" dirty="0" err="1"/>
               <a:t>bad_log</a:t>
             </a:r>
             <a:r>
-              <a:rPr lang="en-US"/>
+              <a:rPr lang="en-US" dirty="0"/>
               <a:t> and </a:t>
             </a:r>
             <a:r>
-              <a:rPr lang="en-US" err="1"/>
+              <a:rPr lang="en-US" dirty="0" err="1"/>
               <a:t>stdout</a:t>
             </a:r>
             <a:r>
-              <a:rPr lang="en-US"/>
+              <a:rPr lang="en-US" dirty="0"/>
               <a:t> should go to a file called </a:t>
             </a:r>
             <a:r>
-              <a:rPr lang="en-US" err="1"/>
+              <a:rPr lang="en-US" dirty="0" err="1"/>
               <a:t>good_log</a:t>
             </a:r>
+            <a:endParaRPr lang="en-US" dirty="0"/>
           </a:p>
           <a:p>
             <a:pPr lvl="1"/>
             <a:r>
-              <a:rPr lang="en-US">
+              <a:rPr lang="en-US" dirty="0">
                 <a:solidFill>
                   <a:srgbClr val="7F7F7F"/>
                 </a:solidFill>
@@ -9331,7 +10050,7 @@
               <a:t>./</a:t>
             </a:r>
             <a:r>
-              <a:rPr lang="en-US" err="1">
+              <a:rPr lang="en-US" dirty="0" err="1">
                 <a:solidFill>
                   <a:srgbClr val="7F7F7F"/>
                 </a:solidFill>
@@ -9340,7 +10059,7 @@
               <a:t>unix_fun</a:t>
             </a:r>
             <a:r>
-              <a:rPr lang="en-US">
+              <a:rPr lang="en-US" dirty="0">
                 <a:solidFill>
                   <a:srgbClr val="7F7F7F"/>
                 </a:solidFill>
@@ -9349,7 +10068,7 @@
               <a:t> 1&gt; </a:t>
             </a:r>
             <a:r>
-              <a:rPr lang="en-US" err="1">
+              <a:rPr lang="en-US" dirty="0" err="1">
                 <a:solidFill>
                   <a:srgbClr val="7F7F7F"/>
                 </a:solidFill>
@@ -9358,7 +10077,7 @@
               <a:t>good_log</a:t>
             </a:r>
             <a:r>
-              <a:rPr lang="en-US">
+              <a:rPr lang="en-US" dirty="0">
                 <a:solidFill>
                   <a:srgbClr val="7F7F7F"/>
                 </a:solidFill>
@@ -9367,7 +10086,7 @@
               <a:t> 2&gt; </a:t>
             </a:r>
             <a:r>
-              <a:rPr lang="en-US" err="1">
+              <a:rPr lang="en-US" dirty="0" err="1" smtClean="0">
                 <a:solidFill>
                   <a:srgbClr val="7F7F7F"/>
                 </a:solidFill>
@@ -9375,28 +10094,148 @@
               </a:rPr>
               <a:t>bad_log</a:t>
             </a:r>
-          </a:p>
-          <a:p>
-            <a:r>
-              <a:rPr lang="en-US">
+            <a:endParaRPr lang="en-US" dirty="0" smtClean="0">
+              <a:solidFill>
+                <a:srgbClr val="7F7F7F"/>
+              </a:solidFill>
+              <a:latin typeface="Calibri"/>
+            </a:endParaRPr>
+          </a:p>
+          <a:p>
+            <a:pPr lvl="1"/>
+            <a:r>
+              <a:rPr lang="en-US" dirty="0" smtClean="0">
+                <a:solidFill>
+                  <a:srgbClr val="7F7F7F"/>
+                </a:solidFill>
+                <a:latin typeface="Calibri"/>
+              </a:rPr>
+              <a:t>cat </a:t>
+            </a:r>
+            <a:r>
+              <a:rPr lang="en-US" dirty="0" err="1" smtClean="0">
+                <a:solidFill>
+                  <a:srgbClr val="7F7F7F"/>
+                </a:solidFill>
+                <a:latin typeface="Calibri"/>
+              </a:rPr>
+              <a:t>good_log</a:t>
+            </a:r>
+            <a:r>
+              <a:rPr lang="en-US" dirty="0" smtClean="0">
+                <a:solidFill>
+                  <a:srgbClr val="7F7F7F"/>
+                </a:solidFill>
+                <a:latin typeface="Calibri"/>
+              </a:rPr>
+              <a:t> </a:t>
+            </a:r>
+            <a:r>
+              <a:rPr lang="en-US" dirty="0" err="1" smtClean="0">
+                <a:solidFill>
+                  <a:srgbClr val="7F7F7F"/>
+                </a:solidFill>
+                <a:latin typeface="Calibri"/>
+              </a:rPr>
+              <a:t>bad_log</a:t>
+            </a:r>
+            <a:r>
+              <a:rPr lang="en-US" dirty="0" smtClean="0">
+                <a:solidFill>
+                  <a:srgbClr val="7F7F7F"/>
+                </a:solidFill>
+                <a:latin typeface="Calibri"/>
+              </a:rPr>
+              <a:t> | </a:t>
+            </a:r>
+            <a:r>
+              <a:rPr lang="en-US" dirty="0" err="1" smtClean="0">
+                <a:solidFill>
+                  <a:srgbClr val="7F7F7F"/>
+                </a:solidFill>
+                <a:latin typeface="Calibri"/>
+              </a:rPr>
+              <a:t>wc</a:t>
+            </a:r>
+            <a:r>
+              <a:rPr lang="en-US" dirty="0" smtClean="0">
+                <a:solidFill>
+                  <a:srgbClr val="7F7F7F"/>
+                </a:solidFill>
+                <a:latin typeface="Calibri"/>
+              </a:rPr>
+              <a:t> –l</a:t>
+            </a:r>
+          </a:p>
+          <a:p>
+            <a:pPr lvl="2"/>
+            <a:r>
+              <a:rPr lang="en-US" dirty="0" smtClean="0">
+                <a:solidFill>
+                  <a:srgbClr val="7F7F7F"/>
+                </a:solidFill>
+                <a:latin typeface="Calibri"/>
+              </a:rPr>
+              <a:t>Check: should be 10,000 print statements/lines</a:t>
+            </a:r>
+          </a:p>
+          <a:p>
+            <a:pPr lvl="2"/>
+            <a:r>
+              <a:rPr lang="en-US" dirty="0" err="1" smtClean="0">
+                <a:solidFill>
+                  <a:srgbClr val="7F7F7F"/>
+                </a:solidFill>
+                <a:latin typeface="Calibri"/>
+              </a:rPr>
+              <a:t>wc</a:t>
+            </a:r>
+            <a:r>
+              <a:rPr lang="en-US" dirty="0" smtClean="0">
+                <a:solidFill>
+                  <a:srgbClr val="7F7F7F"/>
+                </a:solidFill>
+                <a:latin typeface="Calibri"/>
+              </a:rPr>
+              <a:t>: counts number of bytes/words/lines</a:t>
+            </a:r>
+            <a:endParaRPr lang="en-US" dirty="0">
+              <a:solidFill>
+                <a:srgbClr val="7F7F7F"/>
+              </a:solidFill>
+              <a:latin typeface="Calibri"/>
+            </a:endParaRPr>
+          </a:p>
+          <a:p>
+            <a:r>
+              <a:rPr lang="en-US" dirty="0" err="1">
                 <a:solidFill>
                   <a:srgbClr val="000000"/>
                 </a:solidFill>
                 <a:latin typeface="Calibri"/>
               </a:rPr>
-              <a:t>stderr and </a:t>
-            </a:r>
-            <a:r>
-              <a:rPr lang="en-US" err="1">
+              <a:t>stderr</a:t>
+            </a:r>
+            <a:r>
+              <a:rPr lang="en-US" dirty="0">
                 <a:solidFill>
                   <a:srgbClr val="000000"/>
                 </a:solidFill>
                 <a:latin typeface="Calibri"/>
               </a:rPr>
+              <a:t> and </a:t>
+            </a:r>
+            <a:r>
+              <a:rPr lang="en-US" dirty="0" err="1">
+                <a:solidFill>
+                  <a:srgbClr val="000000"/>
+                </a:solidFill>
+                <a:latin typeface="Calibri"/>
+              </a:rPr>
               <a:t>stdout</a:t>
             </a:r>
             <a:r>
-              <a:rPr lang="en-US">
+              <a:rPr lang="en-US" dirty="0">
                 <a:solidFill>
                   <a:srgbClr val="000000"/>
                 </a:solidFill>
@@ -9417,6 +10256,13 @@
   <p:clrMapOvr>
     <a:masterClrMapping/>
   </p:clrMapOvr>
+  <p:timing>
+    <p:tnLst>
+      <p:par>
+        <p:cTn id="1" dur="indefinite" restart="never" nodeType="tmRoot"/>
+      </p:par>
+    </p:tnLst>
+  </p:timing>
 </p:sld>
 </file>
 

</xml_diff>